<commit_message>
new slides for link analysis
</commit_message>
<xml_diff>
--- a/Slides/Link_Analysis_Slides.pptx
+++ b/Slides/Link_Analysis_Slides.pptx
@@ -23014,12 +23014,121 @@
           </a:p>
         </p:txBody>
       </p:sp>
+      <p:sp>
+        <p:nvSpPr>
+          <p:cNvPr id="10" name="TextBox 9">
+            <a:extLst>
+              <a:ext uri="{FF2B5EF4-FFF2-40B4-BE49-F238E27FC236}">
+                <a16:creationId xmlns:a16="http://schemas.microsoft.com/office/drawing/2014/main" id="{E9D8A78F-6B77-9838-2635-43168CCF8B7A}"/>
+              </a:ext>
+            </a:extLst>
+          </p:cNvPr>
+          <p:cNvSpPr txBox="1"/>
+          <p:nvPr/>
+        </p:nvSpPr>
+        <p:spPr>
+          <a:xfrm>
+            <a:off x="6378187" y="1113299"/>
+            <a:ext cx="2454113" cy="2467342"/>
+          </a:xfrm>
+          <a:prstGeom prst="rect">
+            <a:avLst/>
+          </a:prstGeom>
+          <a:noFill/>
+        </p:spPr>
+        <p:txBody>
+          <a:bodyPr wrap="square">
+            <a:spAutoFit/>
+          </a:bodyPr>
+          <a:lstStyle/>
+          <a:p>
+            <a:pPr algn="l">
+              <a:spcBef>
+                <a:spcPts val="1200"/>
+              </a:spcBef>
+              <a:spcAft>
+                <a:spcPts val="1200"/>
+              </a:spcAft>
+            </a:pPr>
+            <a:r>
+              <a:rPr lang="en-US" b="0" i="0" dirty="0">
+                <a:solidFill>
+                  <a:schemeClr val="tx1"/>
+                </a:solidFill>
+                <a:effectLst/>
+                <a:latin typeface="+mn-lt"/>
+              </a:rPr>
+              <a:t>Most listings don't connect to most other listings.</a:t>
+            </a:r>
+          </a:p>
+          <a:p>
+            <a:pPr algn="l">
+              <a:spcBef>
+                <a:spcPts val="450"/>
+              </a:spcBef>
+              <a:spcAft>
+                <a:spcPts val="1200"/>
+              </a:spcAft>
+            </a:pPr>
+            <a:r>
+              <a:rPr lang="en-US" b="0" i="0" dirty="0">
+                <a:solidFill>
+                  <a:schemeClr val="tx1"/>
+                </a:solidFill>
+                <a:effectLst/>
+                <a:latin typeface="+mn-lt"/>
+              </a:rPr>
+              <a:t>The market is </a:t>
+            </a:r>
+            <a:r>
+              <a:rPr lang="en-US" b="1" i="0" dirty="0">
+                <a:solidFill>
+                  <a:schemeClr val="tx1"/>
+                </a:solidFill>
+                <a:effectLst/>
+                <a:latin typeface="+mn-lt"/>
+              </a:rPr>
+              <a:t>highly segmented</a:t>
+            </a:r>
+            <a:r>
+              <a:rPr lang="en-US" b="0" i="0" dirty="0">
+                <a:solidFill>
+                  <a:schemeClr val="tx1"/>
+                </a:solidFill>
+                <a:effectLst/>
+                <a:latin typeface="+mn-lt"/>
+              </a:rPr>
+              <a:t> by criteria (town, flat type, floor area, price).</a:t>
+            </a:r>
+          </a:p>
+          <a:p>
+            <a:pPr algn="l">
+              <a:spcBef>
+                <a:spcPts val="450"/>
+              </a:spcBef>
+              <a:spcAft>
+                <a:spcPts val="1200"/>
+              </a:spcAft>
+            </a:pPr>
+            <a:r>
+              <a:rPr lang="en-US" b="0" i="0" dirty="0">
+                <a:solidFill>
+                  <a:schemeClr val="tx1"/>
+                </a:solidFill>
+                <a:effectLst/>
+                <a:latin typeface="+mn-lt"/>
+              </a:rPr>
+              <a:t>Properties are only comparable to a small subset of similar properties.</a:t>
+            </a:r>
+          </a:p>
+        </p:txBody>
+      </p:sp>
       <p:pic>
         <p:nvPicPr>
-          <p:cNvPr id="8" name="Picture 7">
+          <p:cNvPr id="3" name="Picture 2">
             <a:extLst>
               <a:ext uri="{FF2B5EF4-FFF2-40B4-BE49-F238E27FC236}">
-                <a16:creationId xmlns:a16="http://schemas.microsoft.com/office/drawing/2014/main" id="{E9074768-649E-80AD-D1D4-ECBA21EDAE8F}"/>
+                <a16:creationId xmlns:a16="http://schemas.microsoft.com/office/drawing/2014/main" id="{3CCDB74D-B484-ED52-57AF-BCF7B8F7C7B5}"/>
               </a:ext>
             </a:extLst>
           </p:cNvPr>
@@ -23036,123 +23145,14 @@
         </p:blipFill>
         <p:spPr>
           <a:xfrm>
-            <a:off x="311700" y="999255"/>
-            <a:ext cx="6066487" cy="3759118"/>
+            <a:off x="311700" y="924062"/>
+            <a:ext cx="6075774" cy="3780942"/>
           </a:xfrm>
           <a:prstGeom prst="rect">
             <a:avLst/>
           </a:prstGeom>
         </p:spPr>
       </p:pic>
-      <p:sp>
-        <p:nvSpPr>
-          <p:cNvPr id="10" name="TextBox 9">
-            <a:extLst>
-              <a:ext uri="{FF2B5EF4-FFF2-40B4-BE49-F238E27FC236}">
-                <a16:creationId xmlns:a16="http://schemas.microsoft.com/office/drawing/2014/main" id="{E9D8A78F-6B77-9838-2635-43168CCF8B7A}"/>
-              </a:ext>
-            </a:extLst>
-          </p:cNvPr>
-          <p:cNvSpPr txBox="1"/>
-          <p:nvPr/>
-        </p:nvSpPr>
-        <p:spPr>
-          <a:xfrm>
-            <a:off x="6378187" y="1113299"/>
-            <a:ext cx="2454113" cy="2467342"/>
-          </a:xfrm>
-          <a:prstGeom prst="rect">
-            <a:avLst/>
-          </a:prstGeom>
-          <a:noFill/>
-        </p:spPr>
-        <p:txBody>
-          <a:bodyPr wrap="square">
-            <a:spAutoFit/>
-          </a:bodyPr>
-          <a:lstStyle/>
-          <a:p>
-            <a:pPr algn="l">
-              <a:spcBef>
-                <a:spcPts val="1200"/>
-              </a:spcBef>
-              <a:spcAft>
-                <a:spcPts val="1200"/>
-              </a:spcAft>
-            </a:pPr>
-            <a:r>
-              <a:rPr lang="en-US" b="0" i="0" dirty="0">
-                <a:solidFill>
-                  <a:schemeClr val="tx1"/>
-                </a:solidFill>
-                <a:effectLst/>
-                <a:latin typeface="+mn-lt"/>
-              </a:rPr>
-              <a:t>Most listings don't connect to most other listings.</a:t>
-            </a:r>
-          </a:p>
-          <a:p>
-            <a:pPr algn="l">
-              <a:spcBef>
-                <a:spcPts val="450"/>
-              </a:spcBef>
-              <a:spcAft>
-                <a:spcPts val="1200"/>
-              </a:spcAft>
-            </a:pPr>
-            <a:r>
-              <a:rPr lang="en-US" b="0" i="0" dirty="0">
-                <a:solidFill>
-                  <a:schemeClr val="tx1"/>
-                </a:solidFill>
-                <a:effectLst/>
-                <a:latin typeface="+mn-lt"/>
-              </a:rPr>
-              <a:t>The market is </a:t>
-            </a:r>
-            <a:r>
-              <a:rPr lang="en-US" b="1" i="0" dirty="0">
-                <a:solidFill>
-                  <a:schemeClr val="tx1"/>
-                </a:solidFill>
-                <a:effectLst/>
-                <a:latin typeface="+mn-lt"/>
-              </a:rPr>
-              <a:t>highly segmented</a:t>
-            </a:r>
-            <a:r>
-              <a:rPr lang="en-US" b="0" i="0" dirty="0">
-                <a:solidFill>
-                  <a:schemeClr val="tx1"/>
-                </a:solidFill>
-                <a:effectLst/>
-                <a:latin typeface="+mn-lt"/>
-              </a:rPr>
-              <a:t> by criteria (town, flat type, floor area, price).</a:t>
-            </a:r>
-          </a:p>
-          <a:p>
-            <a:pPr algn="l">
-              <a:spcBef>
-                <a:spcPts val="450"/>
-              </a:spcBef>
-              <a:spcAft>
-                <a:spcPts val="1200"/>
-              </a:spcAft>
-            </a:pPr>
-            <a:r>
-              <a:rPr lang="en-US" b="0" i="0" dirty="0">
-                <a:solidFill>
-                  <a:schemeClr val="tx1"/>
-                </a:solidFill>
-                <a:effectLst/>
-                <a:latin typeface="+mn-lt"/>
-              </a:rPr>
-              <a:t>Properties are only comparable to a small subset of similar properties.</a:t>
-            </a:r>
-          </a:p>
-        </p:txBody>
-      </p:sp>
     </p:spTree>
     <p:extLst>
       <p:ext uri="{BB962C8B-B14F-4D97-AF65-F5344CB8AC3E}">
@@ -23257,7 +23257,7 @@
           <p:nvPr>
             <p:extLst>
               <p:ext uri="{D42A27DB-BD31-4B8C-83A1-F6EECF244321}">
-                <p14:modId xmlns:p14="http://schemas.microsoft.com/office/powerpoint/2010/main" val="1433147910"/>
+                <p14:modId xmlns:p14="http://schemas.microsoft.com/office/powerpoint/2010/main" val="842877519"/>
               </p:ext>
             </p:extLst>
           </p:nvPr>
@@ -23273,21 +23273,1163 @@
                 <a:tableStyleId>{68D230F3-CF80-4859-8CE7-A43EE81993B5}</a:tableStyleId>
               </a:tblPr>
               <a:tblGrid>
-                <a:gridCol w="1202971">
+                <a:gridCol w="951810">
                   <a:extLst>
                     <a:ext uri="{9D8B030D-6E8A-4147-A177-3AD203B41FA5}">
                       <a16:colId xmlns:a16="http://schemas.microsoft.com/office/drawing/2014/main" val="1976745022"/>
                     </a:ext>
                   </a:extLst>
                 </a:gridCol>
-                <a:gridCol w="1202971">
+                <a:gridCol w="1512916">
                   <a:extLst>
                     <a:ext uri="{9D8B030D-6E8A-4147-A177-3AD203B41FA5}">
                       <a16:colId xmlns:a16="http://schemas.microsoft.com/office/drawing/2014/main" val="3545215078"/>
                     </a:ext>
                   </a:extLst>
                 </a:gridCol>
+                <a:gridCol w="1144187">
+                  <a:extLst>
+                    <a:ext uri="{9D8B030D-6E8A-4147-A177-3AD203B41FA5}">
+                      <a16:colId xmlns:a16="http://schemas.microsoft.com/office/drawing/2014/main" val="3582974769"/>
+                    </a:ext>
+                  </a:extLst>
+                </a:gridCol>
+                <a:gridCol w="983871">
+                  <a:extLst>
+                    <a:ext uri="{9D8B030D-6E8A-4147-A177-3AD203B41FA5}">
+                      <a16:colId xmlns:a16="http://schemas.microsoft.com/office/drawing/2014/main" val="1072944167"/>
+                    </a:ext>
+                  </a:extLst>
+                </a:gridCol>
+                <a:gridCol w="1422071">
+                  <a:extLst>
+                    <a:ext uri="{9D8B030D-6E8A-4147-A177-3AD203B41FA5}">
+                      <a16:colId xmlns:a16="http://schemas.microsoft.com/office/drawing/2014/main" val="3814309874"/>
+                    </a:ext>
+                  </a:extLst>
+                </a:gridCol>
                 <a:gridCol w="1202971">
+                  <a:extLst>
+                    <a:ext uri="{9D8B030D-6E8A-4147-A177-3AD203B41FA5}">
+                      <a16:colId xmlns:a16="http://schemas.microsoft.com/office/drawing/2014/main" val="438397181"/>
+                    </a:ext>
+                  </a:extLst>
+                </a:gridCol>
+                <a:gridCol w="1202971">
+                  <a:extLst>
+                    <a:ext uri="{9D8B030D-6E8A-4147-A177-3AD203B41FA5}">
+                      <a16:colId xmlns:a16="http://schemas.microsoft.com/office/drawing/2014/main" val="1298811898"/>
+                    </a:ext>
+                  </a:extLst>
+                </a:gridCol>
+              </a:tblGrid>
+              <a:tr h="370840">
+                <a:tc>
+                  <a:txBody>
+                    <a:bodyPr/>
+                    <a:lstStyle/>
+                    <a:p>
+                      <a:r>
+                        <a:rPr lang="en-US" sz="1400" dirty="0">
+                          <a:latin typeface="+mj-lt"/>
+                        </a:rPr>
+                        <a:t>Date</a:t>
+                      </a:r>
+                      <a:endParaRPr lang="en-SG" sz="1400" dirty="0">
+                        <a:latin typeface="+mj-lt"/>
+                      </a:endParaRPr>
+                    </a:p>
+                  </a:txBody>
+                  <a:tcPr/>
+                </a:tc>
+                <a:tc>
+                  <a:txBody>
+                    <a:bodyPr/>
+                    <a:lstStyle/>
+                    <a:p>
+                      <a:r>
+                        <a:rPr lang="en-US" sz="1400" dirty="0">
+                          <a:latin typeface="+mj-lt"/>
+                        </a:rPr>
+                        <a:t>Town</a:t>
+                      </a:r>
+                      <a:endParaRPr lang="en-SG" sz="1400" dirty="0">
+                        <a:latin typeface="+mj-lt"/>
+                      </a:endParaRPr>
+                    </a:p>
+                  </a:txBody>
+                  <a:tcPr/>
+                </a:tc>
+                <a:tc>
+                  <a:txBody>
+                    <a:bodyPr/>
+                    <a:lstStyle/>
+                    <a:p>
+                      <a:r>
+                        <a:rPr lang="en-US" sz="1400" dirty="0">
+                          <a:latin typeface="+mj-lt"/>
+                        </a:rPr>
+                        <a:t>Flat Type</a:t>
+                      </a:r>
+                      <a:endParaRPr lang="en-SG" sz="1400" dirty="0">
+                        <a:latin typeface="+mj-lt"/>
+                      </a:endParaRPr>
+                    </a:p>
+                  </a:txBody>
+                  <a:tcPr/>
+                </a:tc>
+                <a:tc>
+                  <a:txBody>
+                    <a:bodyPr/>
+                    <a:lstStyle/>
+                    <a:p>
+                      <a:r>
+                        <a:rPr lang="en-US" sz="1400" dirty="0">
+                          <a:latin typeface="+mj-lt"/>
+                        </a:rPr>
+                        <a:t>Block</a:t>
+                      </a:r>
+                      <a:endParaRPr lang="en-SG" sz="1400" dirty="0">
+                        <a:latin typeface="+mj-lt"/>
+                      </a:endParaRPr>
+                    </a:p>
+                  </a:txBody>
+                  <a:tcPr/>
+                </a:tc>
+                <a:tc>
+                  <a:txBody>
+                    <a:bodyPr/>
+                    <a:lstStyle/>
+                    <a:p>
+                      <a:r>
+                        <a:rPr lang="en-US" sz="1400" dirty="0">
+                          <a:latin typeface="+mj-lt"/>
+                        </a:rPr>
+                        <a:t>Street Name</a:t>
+                      </a:r>
+                      <a:endParaRPr lang="en-SG" sz="1400" dirty="0">
+                        <a:latin typeface="+mj-lt"/>
+                      </a:endParaRPr>
+                    </a:p>
+                  </a:txBody>
+                  <a:tcPr/>
+                </a:tc>
+                <a:tc>
+                  <a:txBody>
+                    <a:bodyPr/>
+                    <a:lstStyle/>
+                    <a:p>
+                      <a:r>
+                        <a:rPr lang="en-US" sz="1400" dirty="0">
+                          <a:latin typeface="+mj-lt"/>
+                        </a:rPr>
+                        <a:t>Resale price</a:t>
+                      </a:r>
+                      <a:endParaRPr lang="en-SG" sz="1400" dirty="0">
+                        <a:latin typeface="+mj-lt"/>
+                      </a:endParaRPr>
+                    </a:p>
+                  </a:txBody>
+                  <a:tcPr/>
+                </a:tc>
+                <a:tc>
+                  <a:txBody>
+                    <a:bodyPr/>
+                    <a:lstStyle/>
+                    <a:p>
+                      <a:r>
+                        <a:rPr lang="en-US" sz="1400" dirty="0">
+                          <a:latin typeface="+mj-lt"/>
+                        </a:rPr>
+                        <a:t>Number of connections</a:t>
+                      </a:r>
+                      <a:endParaRPr lang="en-SG" sz="1400" dirty="0">
+                        <a:latin typeface="+mj-lt"/>
+                      </a:endParaRPr>
+                    </a:p>
+                  </a:txBody>
+                  <a:tcPr/>
+                </a:tc>
+                <a:extLst>
+                  <a:ext uri="{0D108BD9-81ED-4DB2-BD59-A6C34878D82A}">
+                    <a16:rowId xmlns:a16="http://schemas.microsoft.com/office/drawing/2014/main" val="2259017882"/>
+                  </a:ext>
+                </a:extLst>
+              </a:tr>
+              <a:tr h="370840">
+                <a:tc>
+                  <a:txBody>
+                    <a:bodyPr/>
+                    <a:lstStyle/>
+                    <a:p>
+                      <a:pPr algn="r">
+                        <a:lnSpc>
+                          <a:spcPts val="1875"/>
+                        </a:lnSpc>
+                        <a:buNone/>
+                      </a:pPr>
+                      <a:r>
+                        <a:rPr lang="en-SG" sz="1400" b="0">
+                          <a:effectLst/>
+                          <a:latin typeface="+mj-lt"/>
+                        </a:rPr>
+                        <a:t>2018-03</a:t>
+                      </a:r>
+                    </a:p>
+                  </a:txBody>
+                  <a:tcPr marR="152400" marT="95250" marB="95250" anchor="ctr">
+                    <a:solidFill>
+                      <a:schemeClr val="bg1">
+                        <a:alpha val="20000"/>
+                      </a:schemeClr>
+                    </a:solidFill>
+                  </a:tcPr>
+                </a:tc>
+                <a:tc>
+                  <a:txBody>
+                    <a:bodyPr/>
+                    <a:lstStyle/>
+                    <a:p>
+                      <a:pPr algn="ctr">
+                        <a:lnSpc>
+                          <a:spcPts val="1875"/>
+                        </a:lnSpc>
+                        <a:buNone/>
+                      </a:pPr>
+                      <a:r>
+                        <a:rPr lang="en-SG" sz="1400" b="0" dirty="0">
+                          <a:effectLst/>
+                          <a:latin typeface="+mj-lt"/>
+                        </a:rPr>
+                        <a:t>SENGKANG</a:t>
+                      </a:r>
+                    </a:p>
+                  </a:txBody>
+                  <a:tcPr marL="152400" marR="152400" marT="95250" marB="95250" anchor="ctr">
+                    <a:solidFill>
+                      <a:schemeClr val="bg1">
+                        <a:alpha val="20000"/>
+                      </a:schemeClr>
+                    </a:solidFill>
+                  </a:tcPr>
+                </a:tc>
+                <a:tc>
+                  <a:txBody>
+                    <a:bodyPr/>
+                    <a:lstStyle/>
+                    <a:p>
+                      <a:pPr algn="r">
+                        <a:lnSpc>
+                          <a:spcPts val="1875"/>
+                        </a:lnSpc>
+                        <a:buNone/>
+                      </a:pPr>
+                      <a:r>
+                        <a:rPr lang="en-SG" sz="1400" b="0">
+                          <a:effectLst/>
+                          <a:latin typeface="+mj-lt"/>
+                        </a:rPr>
+                        <a:t>4 ROOM</a:t>
+                      </a:r>
+                    </a:p>
+                  </a:txBody>
+                  <a:tcPr marL="152400" marR="152400" marT="95250" marB="95250" anchor="ctr">
+                    <a:solidFill>
+                      <a:schemeClr val="bg1">
+                        <a:alpha val="20000"/>
+                      </a:schemeClr>
+                    </a:solidFill>
+                  </a:tcPr>
+                </a:tc>
+                <a:tc>
+                  <a:txBody>
+                    <a:bodyPr/>
+                    <a:lstStyle/>
+                    <a:p>
+                      <a:pPr algn="r">
+                        <a:lnSpc>
+                          <a:spcPts val="1875"/>
+                        </a:lnSpc>
+                        <a:buNone/>
+                      </a:pPr>
+                      <a:r>
+                        <a:rPr lang="en-SG" sz="1400" b="0">
+                          <a:effectLst/>
+                          <a:latin typeface="+mj-lt"/>
+                        </a:rPr>
+                        <a:t>434B</a:t>
+                      </a:r>
+                    </a:p>
+                  </a:txBody>
+                  <a:tcPr marL="152400" marR="152400" marT="95250" marB="95250" anchor="ctr">
+                    <a:solidFill>
+                      <a:schemeClr val="bg1">
+                        <a:alpha val="20000"/>
+                      </a:schemeClr>
+                    </a:solidFill>
+                  </a:tcPr>
+                </a:tc>
+                <a:tc>
+                  <a:txBody>
+                    <a:bodyPr/>
+                    <a:lstStyle/>
+                    <a:p>
+                      <a:pPr algn="r">
+                        <a:lnSpc>
+                          <a:spcPts val="1875"/>
+                        </a:lnSpc>
+                        <a:buNone/>
+                      </a:pPr>
+                      <a:r>
+                        <a:rPr lang="en-SG" sz="1400" b="0">
+                          <a:effectLst/>
+                          <a:latin typeface="+mj-lt"/>
+                        </a:rPr>
+                        <a:t>FERNVALE RD</a:t>
+                      </a:r>
+                    </a:p>
+                  </a:txBody>
+                  <a:tcPr marL="152400" marR="152400" marT="95250" marB="95250" anchor="ctr">
+                    <a:solidFill>
+                      <a:schemeClr val="bg1">
+                        <a:alpha val="20000"/>
+                      </a:schemeClr>
+                    </a:solidFill>
+                  </a:tcPr>
+                </a:tc>
+                <a:tc>
+                  <a:txBody>
+                    <a:bodyPr/>
+                    <a:lstStyle/>
+                    <a:p>
+                      <a:pPr algn="r">
+                        <a:lnSpc>
+                          <a:spcPts val="1875"/>
+                        </a:lnSpc>
+                        <a:buNone/>
+                      </a:pPr>
+                      <a:r>
+                        <a:rPr lang="en-SG" sz="1400" b="0">
+                          <a:effectLst/>
+                          <a:latin typeface="+mj-lt"/>
+                        </a:rPr>
+                        <a:t>415000.0</a:t>
+                      </a:r>
+                    </a:p>
+                  </a:txBody>
+                  <a:tcPr marL="152400" marR="152400" marT="95250" marB="95250" anchor="ctr">
+                    <a:solidFill>
+                      <a:schemeClr val="bg1">
+                        <a:alpha val="20000"/>
+                      </a:schemeClr>
+                    </a:solidFill>
+                  </a:tcPr>
+                </a:tc>
+                <a:tc>
+                  <a:txBody>
+                    <a:bodyPr/>
+                    <a:lstStyle/>
+                    <a:p>
+                      <a:pPr algn="r">
+                        <a:lnSpc>
+                          <a:spcPts val="1875"/>
+                        </a:lnSpc>
+                        <a:buNone/>
+                      </a:pPr>
+                      <a:r>
+                        <a:rPr lang="en-SG" sz="1400" b="0">
+                          <a:effectLst/>
+                          <a:latin typeface="+mj-lt"/>
+                        </a:rPr>
+                        <a:t>1802</a:t>
+                      </a:r>
+                    </a:p>
+                  </a:txBody>
+                  <a:tcPr marL="152400" marT="95250" marB="95250" anchor="ctr">
+                    <a:solidFill>
+                      <a:schemeClr val="bg1">
+                        <a:alpha val="20000"/>
+                      </a:schemeClr>
+                    </a:solidFill>
+                  </a:tcPr>
+                </a:tc>
+                <a:extLst>
+                  <a:ext uri="{0D108BD9-81ED-4DB2-BD59-A6C34878D82A}">
+                    <a16:rowId xmlns:a16="http://schemas.microsoft.com/office/drawing/2014/main" val="2284305626"/>
+                  </a:ext>
+                </a:extLst>
+              </a:tr>
+              <a:tr h="370840">
+                <a:tc>
+                  <a:txBody>
+                    <a:bodyPr/>
+                    <a:lstStyle/>
+                    <a:p>
+                      <a:pPr algn="r">
+                        <a:lnSpc>
+                          <a:spcPts val="1875"/>
+                        </a:lnSpc>
+                        <a:buNone/>
+                      </a:pPr>
+                      <a:r>
+                        <a:rPr lang="en-SG" sz="1400" b="0">
+                          <a:effectLst/>
+                          <a:latin typeface="+mj-lt"/>
+                        </a:rPr>
+                        <a:t>2019-11</a:t>
+                      </a:r>
+                    </a:p>
+                  </a:txBody>
+                  <a:tcPr marR="152400" marT="95250" marB="95250" anchor="ctr"/>
+                </a:tc>
+                <a:tc>
+                  <a:txBody>
+                    <a:bodyPr/>
+                    <a:lstStyle/>
+                    <a:p>
+                      <a:pPr algn="ctr">
+                        <a:lnSpc>
+                          <a:spcPts val="1875"/>
+                        </a:lnSpc>
+                        <a:buNone/>
+                      </a:pPr>
+                      <a:r>
+                        <a:rPr lang="en-SG" sz="1400" b="0" dirty="0">
+                          <a:effectLst/>
+                          <a:latin typeface="+mj-lt"/>
+                        </a:rPr>
+                        <a:t>PUNGGOL</a:t>
+                      </a:r>
+                    </a:p>
+                  </a:txBody>
+                  <a:tcPr marL="152400" marR="152400" marT="95250" marB="95250" anchor="ctr"/>
+                </a:tc>
+                <a:tc>
+                  <a:txBody>
+                    <a:bodyPr/>
+                    <a:lstStyle/>
+                    <a:p>
+                      <a:pPr algn="r">
+                        <a:lnSpc>
+                          <a:spcPts val="1875"/>
+                        </a:lnSpc>
+                        <a:buNone/>
+                      </a:pPr>
+                      <a:r>
+                        <a:rPr lang="en-SG" sz="1400" b="0">
+                          <a:effectLst/>
+                          <a:latin typeface="+mj-lt"/>
+                        </a:rPr>
+                        <a:t>4 ROOM</a:t>
+                      </a:r>
+                    </a:p>
+                  </a:txBody>
+                  <a:tcPr marL="152400" marR="152400" marT="95250" marB="95250" anchor="ctr"/>
+                </a:tc>
+                <a:tc>
+                  <a:txBody>
+                    <a:bodyPr/>
+                    <a:lstStyle/>
+                    <a:p>
+                      <a:pPr algn="r">
+                        <a:lnSpc>
+                          <a:spcPts val="1875"/>
+                        </a:lnSpc>
+                        <a:buNone/>
+                      </a:pPr>
+                      <a:r>
+                        <a:rPr lang="en-SG" sz="1400" b="0">
+                          <a:effectLst/>
+                          <a:latin typeface="+mj-lt"/>
+                        </a:rPr>
+                        <a:t>672D</a:t>
+                      </a:r>
+                    </a:p>
+                  </a:txBody>
+                  <a:tcPr marL="152400" marR="152400" marT="95250" marB="95250" anchor="ctr"/>
+                </a:tc>
+                <a:tc>
+                  <a:txBody>
+                    <a:bodyPr/>
+                    <a:lstStyle/>
+                    <a:p>
+                      <a:pPr algn="r">
+                        <a:lnSpc>
+                          <a:spcPts val="1875"/>
+                        </a:lnSpc>
+                        <a:buNone/>
+                      </a:pPr>
+                      <a:r>
+                        <a:rPr lang="en-SG" sz="1400" b="0">
+                          <a:effectLst/>
+                          <a:latin typeface="+mj-lt"/>
+                        </a:rPr>
+                        <a:t>EDGEFIELD PLAINS</a:t>
+                      </a:r>
+                    </a:p>
+                  </a:txBody>
+                  <a:tcPr marL="152400" marR="152400" marT="95250" marB="95250" anchor="ctr"/>
+                </a:tc>
+                <a:tc>
+                  <a:txBody>
+                    <a:bodyPr/>
+                    <a:lstStyle/>
+                    <a:p>
+                      <a:pPr algn="r">
+                        <a:lnSpc>
+                          <a:spcPts val="1875"/>
+                        </a:lnSpc>
+                        <a:buNone/>
+                      </a:pPr>
+                      <a:r>
+                        <a:rPr lang="en-SG" sz="1400" b="0">
+                          <a:effectLst/>
+                          <a:latin typeface="+mj-lt"/>
+                        </a:rPr>
+                        <a:t>463888.0</a:t>
+                      </a:r>
+                    </a:p>
+                  </a:txBody>
+                  <a:tcPr marL="152400" marR="152400" marT="95250" marB="95250" anchor="ctr"/>
+                </a:tc>
+                <a:tc>
+                  <a:txBody>
+                    <a:bodyPr/>
+                    <a:lstStyle/>
+                    <a:p>
+                      <a:pPr algn="r">
+                        <a:lnSpc>
+                          <a:spcPts val="1875"/>
+                        </a:lnSpc>
+                        <a:buNone/>
+                      </a:pPr>
+                      <a:r>
+                        <a:rPr lang="en-SG" sz="1400" b="0">
+                          <a:effectLst/>
+                          <a:latin typeface="+mj-lt"/>
+                        </a:rPr>
+                        <a:t>1688</a:t>
+                      </a:r>
+                    </a:p>
+                  </a:txBody>
+                  <a:tcPr marL="152400" marT="95250" marB="95250" anchor="ctr"/>
+                </a:tc>
+                <a:extLst>
+                  <a:ext uri="{0D108BD9-81ED-4DB2-BD59-A6C34878D82A}">
+                    <a16:rowId xmlns:a16="http://schemas.microsoft.com/office/drawing/2014/main" val="2474339768"/>
+                  </a:ext>
+                </a:extLst>
+              </a:tr>
+              <a:tr h="370840">
+                <a:tc>
+                  <a:txBody>
+                    <a:bodyPr/>
+                    <a:lstStyle/>
+                    <a:p>
+                      <a:pPr algn="r">
+                        <a:lnSpc>
+                          <a:spcPts val="1875"/>
+                        </a:lnSpc>
+                        <a:buNone/>
+                      </a:pPr>
+                      <a:r>
+                        <a:rPr lang="en-SG" sz="1400" b="0">
+                          <a:effectLst/>
+                          <a:latin typeface="+mj-lt"/>
+                        </a:rPr>
+                        <a:t>2018-01</a:t>
+                      </a:r>
+                    </a:p>
+                  </a:txBody>
+                  <a:tcPr marR="152400" marT="95250" marB="95250" anchor="ctr">
+                    <a:solidFill>
+                      <a:schemeClr val="bg1">
+                        <a:alpha val="20000"/>
+                      </a:schemeClr>
+                    </a:solidFill>
+                  </a:tcPr>
+                </a:tc>
+                <a:tc>
+                  <a:txBody>
+                    <a:bodyPr/>
+                    <a:lstStyle/>
+                    <a:p>
+                      <a:pPr algn="ctr">
+                        <a:lnSpc>
+                          <a:spcPts val="1875"/>
+                        </a:lnSpc>
+                        <a:buNone/>
+                      </a:pPr>
+                      <a:r>
+                        <a:rPr lang="en-SG" sz="1400" b="0" dirty="0">
+                          <a:effectLst/>
+                          <a:latin typeface="+mj-lt"/>
+                        </a:rPr>
+                        <a:t>WOODLANDS</a:t>
+                      </a:r>
+                    </a:p>
+                  </a:txBody>
+                  <a:tcPr marL="152400" marR="152400" marT="95250" marB="95250" anchor="ctr">
+                    <a:solidFill>
+                      <a:schemeClr val="bg1">
+                        <a:alpha val="20000"/>
+                      </a:schemeClr>
+                    </a:solidFill>
+                  </a:tcPr>
+                </a:tc>
+                <a:tc>
+                  <a:txBody>
+                    <a:bodyPr/>
+                    <a:lstStyle/>
+                    <a:p>
+                      <a:pPr algn="r">
+                        <a:lnSpc>
+                          <a:spcPts val="1875"/>
+                        </a:lnSpc>
+                        <a:buNone/>
+                      </a:pPr>
+                      <a:r>
+                        <a:rPr lang="en-SG" sz="1400" b="0">
+                          <a:effectLst/>
+                          <a:latin typeface="+mj-lt"/>
+                        </a:rPr>
+                        <a:t>4 ROOM</a:t>
+                      </a:r>
+                    </a:p>
+                  </a:txBody>
+                  <a:tcPr marL="152400" marR="152400" marT="95250" marB="95250" anchor="ctr">
+                    <a:solidFill>
+                      <a:schemeClr val="bg1">
+                        <a:alpha val="20000"/>
+                      </a:schemeClr>
+                    </a:solidFill>
+                  </a:tcPr>
+                </a:tc>
+                <a:tc>
+                  <a:txBody>
+                    <a:bodyPr/>
+                    <a:lstStyle/>
+                    <a:p>
+                      <a:pPr algn="r">
+                        <a:lnSpc>
+                          <a:spcPts val="1875"/>
+                        </a:lnSpc>
+                        <a:buNone/>
+                      </a:pPr>
+                      <a:r>
+                        <a:rPr lang="en-SG" sz="1400" b="0">
+                          <a:effectLst/>
+                          <a:latin typeface="+mj-lt"/>
+                        </a:rPr>
+                        <a:t>627</a:t>
+                      </a:r>
+                    </a:p>
+                  </a:txBody>
+                  <a:tcPr marL="152400" marR="152400" marT="95250" marB="95250" anchor="ctr">
+                    <a:solidFill>
+                      <a:schemeClr val="bg1">
+                        <a:alpha val="20000"/>
+                      </a:schemeClr>
+                    </a:solidFill>
+                  </a:tcPr>
+                </a:tc>
+                <a:tc>
+                  <a:txBody>
+                    <a:bodyPr/>
+                    <a:lstStyle/>
+                    <a:p>
+                      <a:pPr algn="r">
+                        <a:lnSpc>
+                          <a:spcPts val="1875"/>
+                        </a:lnSpc>
+                        <a:buNone/>
+                      </a:pPr>
+                      <a:r>
+                        <a:rPr lang="en-SG" sz="1400" b="0">
+                          <a:effectLst/>
+                          <a:latin typeface="+mj-lt"/>
+                        </a:rPr>
+                        <a:t>WOODLANDS AVE 6</a:t>
+                      </a:r>
+                    </a:p>
+                  </a:txBody>
+                  <a:tcPr marL="152400" marR="152400" marT="95250" marB="95250" anchor="ctr">
+                    <a:solidFill>
+                      <a:schemeClr val="bg1">
+                        <a:alpha val="20000"/>
+                      </a:schemeClr>
+                    </a:solidFill>
+                  </a:tcPr>
+                </a:tc>
+                <a:tc>
+                  <a:txBody>
+                    <a:bodyPr/>
+                    <a:lstStyle/>
+                    <a:p>
+                      <a:pPr algn="r">
+                        <a:lnSpc>
+                          <a:spcPts val="1875"/>
+                        </a:lnSpc>
+                        <a:buNone/>
+                      </a:pPr>
+                      <a:r>
+                        <a:rPr lang="en-SG" sz="1400" b="0">
+                          <a:effectLst/>
+                          <a:latin typeface="+mj-lt"/>
+                        </a:rPr>
+                        <a:t>330000.0</a:t>
+                      </a:r>
+                    </a:p>
+                  </a:txBody>
+                  <a:tcPr marL="152400" marR="152400" marT="95250" marB="95250" anchor="ctr">
+                    <a:solidFill>
+                      <a:schemeClr val="bg1">
+                        <a:alpha val="20000"/>
+                      </a:schemeClr>
+                    </a:solidFill>
+                  </a:tcPr>
+                </a:tc>
+                <a:tc>
+                  <a:txBody>
+                    <a:bodyPr/>
+                    <a:lstStyle/>
+                    <a:p>
+                      <a:pPr algn="r">
+                        <a:lnSpc>
+                          <a:spcPts val="1875"/>
+                        </a:lnSpc>
+                        <a:buNone/>
+                      </a:pPr>
+                      <a:r>
+                        <a:rPr lang="en-SG" sz="1400" b="0">
+                          <a:effectLst/>
+                          <a:latin typeface="+mj-lt"/>
+                        </a:rPr>
+                        <a:t>1662</a:t>
+                      </a:r>
+                    </a:p>
+                  </a:txBody>
+                  <a:tcPr marL="152400" marT="95250" marB="95250" anchor="ctr">
+                    <a:solidFill>
+                      <a:schemeClr val="bg1">
+                        <a:alpha val="20000"/>
+                      </a:schemeClr>
+                    </a:solidFill>
+                  </a:tcPr>
+                </a:tc>
+                <a:extLst>
+                  <a:ext uri="{0D108BD9-81ED-4DB2-BD59-A6C34878D82A}">
+                    <a16:rowId xmlns:a16="http://schemas.microsoft.com/office/drawing/2014/main" val="2117236267"/>
+                  </a:ext>
+                </a:extLst>
+              </a:tr>
+              <a:tr h="370840">
+                <a:tc>
+                  <a:txBody>
+                    <a:bodyPr/>
+                    <a:lstStyle/>
+                    <a:p>
+                      <a:pPr algn="r">
+                        <a:lnSpc>
+                          <a:spcPts val="1875"/>
+                        </a:lnSpc>
+                        <a:buNone/>
+                      </a:pPr>
+                      <a:r>
+                        <a:rPr lang="en-SG" sz="1400" b="0">
+                          <a:effectLst/>
+                          <a:latin typeface="+mj-lt"/>
+                        </a:rPr>
+                        <a:t>2020-02</a:t>
+                      </a:r>
+                    </a:p>
+                  </a:txBody>
+                  <a:tcPr marR="152400" marT="95250" marB="95250" anchor="ctr"/>
+                </a:tc>
+                <a:tc>
+                  <a:txBody>
+                    <a:bodyPr/>
+                    <a:lstStyle/>
+                    <a:p>
+                      <a:pPr algn="ctr">
+                        <a:lnSpc>
+                          <a:spcPts val="1875"/>
+                        </a:lnSpc>
+                        <a:buNone/>
+                      </a:pPr>
+                      <a:r>
+                        <a:rPr lang="en-SG" sz="1400" b="0" dirty="0">
+                          <a:effectLst/>
+                          <a:latin typeface="+mj-lt"/>
+                        </a:rPr>
+                        <a:t>TAMPINES</a:t>
+                      </a:r>
+                    </a:p>
+                  </a:txBody>
+                  <a:tcPr marL="152400" marR="152400" marT="95250" marB="95250" anchor="ctr"/>
+                </a:tc>
+                <a:tc>
+                  <a:txBody>
+                    <a:bodyPr/>
+                    <a:lstStyle/>
+                    <a:p>
+                      <a:pPr algn="r">
+                        <a:lnSpc>
+                          <a:spcPts val="1875"/>
+                        </a:lnSpc>
+                        <a:buNone/>
+                      </a:pPr>
+                      <a:r>
+                        <a:rPr lang="en-SG" sz="1400" b="0">
+                          <a:effectLst/>
+                          <a:latin typeface="+mj-lt"/>
+                        </a:rPr>
+                        <a:t>4 ROOM</a:t>
+                      </a:r>
+                    </a:p>
+                  </a:txBody>
+                  <a:tcPr marL="152400" marR="152400" marT="95250" marB="95250" anchor="ctr"/>
+                </a:tc>
+                <a:tc>
+                  <a:txBody>
+                    <a:bodyPr/>
+                    <a:lstStyle/>
+                    <a:p>
+                      <a:pPr algn="r">
+                        <a:lnSpc>
+                          <a:spcPts val="1875"/>
+                        </a:lnSpc>
+                        <a:buNone/>
+                      </a:pPr>
+                      <a:r>
+                        <a:rPr lang="en-SG" sz="1400" b="0">
+                          <a:effectLst/>
+                          <a:latin typeface="+mj-lt"/>
+                        </a:rPr>
+                        <a:t>735</a:t>
+                      </a:r>
+                    </a:p>
+                  </a:txBody>
+                  <a:tcPr marL="152400" marR="152400" marT="95250" marB="95250" anchor="ctr"/>
+                </a:tc>
+                <a:tc>
+                  <a:txBody>
+                    <a:bodyPr/>
+                    <a:lstStyle/>
+                    <a:p>
+                      <a:pPr algn="r">
+                        <a:lnSpc>
+                          <a:spcPts val="1875"/>
+                        </a:lnSpc>
+                        <a:buNone/>
+                      </a:pPr>
+                      <a:r>
+                        <a:rPr lang="en-SG" sz="1400" b="0">
+                          <a:effectLst/>
+                          <a:latin typeface="+mj-lt"/>
+                        </a:rPr>
+                        <a:t>TAMPINES ST 72</a:t>
+                      </a:r>
+                    </a:p>
+                  </a:txBody>
+                  <a:tcPr marL="152400" marR="152400" marT="95250" marB="95250" anchor="ctr"/>
+                </a:tc>
+                <a:tc>
+                  <a:txBody>
+                    <a:bodyPr/>
+                    <a:lstStyle/>
+                    <a:p>
+                      <a:pPr algn="r">
+                        <a:lnSpc>
+                          <a:spcPts val="1875"/>
+                        </a:lnSpc>
+                        <a:buNone/>
+                      </a:pPr>
+                      <a:r>
+                        <a:rPr lang="en-SG" sz="1400" b="0">
+                          <a:effectLst/>
+                          <a:latin typeface="+mj-lt"/>
+                        </a:rPr>
+                        <a:t>433000.0</a:t>
+                      </a:r>
+                    </a:p>
+                  </a:txBody>
+                  <a:tcPr marL="152400" marR="152400" marT="95250" marB="95250" anchor="ctr"/>
+                </a:tc>
+                <a:tc>
+                  <a:txBody>
+                    <a:bodyPr/>
+                    <a:lstStyle/>
+                    <a:p>
+                      <a:pPr algn="r">
+                        <a:lnSpc>
+                          <a:spcPts val="1875"/>
+                        </a:lnSpc>
+                        <a:buNone/>
+                      </a:pPr>
+                      <a:r>
+                        <a:rPr lang="en-SG" sz="1400" b="0" dirty="0">
+                          <a:effectLst/>
+                          <a:latin typeface="+mj-lt"/>
+                        </a:rPr>
+                        <a:t>1298</a:t>
+                      </a:r>
+                    </a:p>
+                  </a:txBody>
+                  <a:tcPr marL="152400" marT="95250" marB="95250" anchor="ctr"/>
+                </a:tc>
+                <a:extLst>
+                  <a:ext uri="{0D108BD9-81ED-4DB2-BD59-A6C34878D82A}">
+                    <a16:rowId xmlns:a16="http://schemas.microsoft.com/office/drawing/2014/main" val="2026303842"/>
+                  </a:ext>
+                </a:extLst>
+              </a:tr>
+            </a:tbl>
+          </a:graphicData>
+        </a:graphic>
+      </p:graphicFrame>
+      <p:sp>
+        <p:nvSpPr>
+          <p:cNvPr id="8" name="TextBox 7">
+            <a:extLst>
+              <a:ext uri="{FF2B5EF4-FFF2-40B4-BE49-F238E27FC236}">
+                <a16:creationId xmlns:a16="http://schemas.microsoft.com/office/drawing/2014/main" id="{08A69FBC-3756-9D48-6CB4-084F949CF128}"/>
+              </a:ext>
+            </a:extLst>
+          </p:cNvPr>
+          <p:cNvSpPr txBox="1"/>
+          <p:nvPr/>
+        </p:nvSpPr>
+        <p:spPr>
+          <a:xfrm>
+            <a:off x="2285999" y="4086735"/>
+            <a:ext cx="4572000" cy="523220"/>
+          </a:xfrm>
+          <a:prstGeom prst="rect">
+            <a:avLst/>
+          </a:prstGeom>
+          <a:noFill/>
+        </p:spPr>
+        <p:txBody>
+          <a:bodyPr wrap="square">
+            <a:spAutoFit/>
+          </a:bodyPr>
+          <a:lstStyle/>
+          <a:p>
+            <a:pPr algn="l">
+              <a:spcBef>
+                <a:spcPts val="1200"/>
+              </a:spcBef>
+              <a:spcAft>
+                <a:spcPts val="1200"/>
+              </a:spcAft>
+            </a:pPr>
+            <a:r>
+              <a:rPr lang="en-US" b="0" i="0" dirty="0">
+                <a:solidFill>
+                  <a:schemeClr val="tx1"/>
+                </a:solidFill>
+                <a:effectLst/>
+                <a:latin typeface="+mn-lt"/>
+              </a:rPr>
+              <a:t>Interpretation</a:t>
+            </a:r>
+            <a:r>
+              <a:rPr lang="en-US" dirty="0">
+                <a:solidFill>
+                  <a:schemeClr val="tx1"/>
+                </a:solidFill>
+                <a:latin typeface="+mn-lt"/>
+              </a:rPr>
+              <a:t>: these properties serve as price benchmarks for their respective </a:t>
+            </a:r>
+            <a:r>
+              <a:rPr lang="en-US" b="1" dirty="0">
+                <a:solidFill>
+                  <a:schemeClr val="tx1"/>
+                </a:solidFill>
+                <a:latin typeface="+mn-lt"/>
+              </a:rPr>
+              <a:t>town</a:t>
+            </a:r>
+            <a:r>
+              <a:rPr lang="en-US" dirty="0">
+                <a:solidFill>
+                  <a:schemeClr val="tx1"/>
+                </a:solidFill>
+                <a:latin typeface="+mn-lt"/>
+              </a:rPr>
+              <a:t> and </a:t>
+            </a:r>
+            <a:r>
+              <a:rPr lang="en-US" b="1" dirty="0">
+                <a:solidFill>
+                  <a:schemeClr val="tx1"/>
+                </a:solidFill>
+                <a:latin typeface="+mn-lt"/>
+              </a:rPr>
+              <a:t>flat type</a:t>
+            </a:r>
+            <a:r>
+              <a:rPr lang="en-US" dirty="0">
+                <a:solidFill>
+                  <a:schemeClr val="tx1"/>
+                </a:solidFill>
+                <a:latin typeface="+mn-lt"/>
+              </a:rPr>
+              <a:t>.</a:t>
+            </a:r>
+            <a:endParaRPr lang="en-US" b="0" i="0" dirty="0">
+              <a:solidFill>
+                <a:schemeClr val="tx1"/>
+              </a:solidFill>
+              <a:effectLst/>
+              <a:latin typeface="+mn-lt"/>
+            </a:endParaRPr>
+          </a:p>
+        </p:txBody>
+      </p:sp>
+    </p:spTree>
+    <p:extLst>
+      <p:ext uri="{BB962C8B-B14F-4D97-AF65-F5344CB8AC3E}">
+        <p14:creationId xmlns:p14="http://schemas.microsoft.com/office/powerpoint/2010/main" val="1865239740"/>
+      </p:ext>
+    </p:extLst>
+  </p:cSld>
+  <p:clrMapOvr>
+    <a:masterClrMapping/>
+  </p:clrMapOvr>
+</p:sld>
+</file>
+
+<file path=ppt/slides/slide6.xml><?xml version="1.0" encoding="utf-8"?>
+<p:sld xmlns:a="http://schemas.openxmlformats.org/drawingml/2006/main" xmlns:r="http://schemas.openxmlformats.org/officeDocument/2006/relationships" xmlns:p="http://schemas.openxmlformats.org/presentationml/2006/main">
+  <p:cSld>
+    <p:spTree>
+      <p:nvGrpSpPr>
+        <p:cNvPr id="1" name="">
+          <a:extLst>
+            <a:ext uri="{FF2B5EF4-FFF2-40B4-BE49-F238E27FC236}">
+              <a16:creationId xmlns:a16="http://schemas.microsoft.com/office/drawing/2014/main" id="{88D2EB96-7036-13FD-EBE3-14566A819859}"/>
+            </a:ext>
+          </a:extLst>
+        </p:cNvPr>
+        <p:cNvGrpSpPr/>
+        <p:nvPr/>
+      </p:nvGrpSpPr>
+      <p:grpSpPr>
+        <a:xfrm>
+          <a:off x="0" y="0"/>
+          <a:ext cx="0" cy="0"/>
+          <a:chOff x="0" y="0"/>
+          <a:chExt cx="0" cy="0"/>
+        </a:xfrm>
+      </p:grpSpPr>
+      <p:sp>
+        <p:nvSpPr>
+          <p:cNvPr id="2" name="Title 1">
+            <a:extLst>
+              <a:ext uri="{FF2B5EF4-FFF2-40B4-BE49-F238E27FC236}">
+                <a16:creationId xmlns:a16="http://schemas.microsoft.com/office/drawing/2014/main" id="{309C311B-0D57-07BD-3DC5-C7BC0B961AB9}"/>
+              </a:ext>
+            </a:extLst>
+          </p:cNvPr>
+          <p:cNvSpPr>
+            <a:spLocks noGrp="1"/>
+          </p:cNvSpPr>
+          <p:nvPr>
+            <p:ph type="title"/>
+          </p:nvPr>
+        </p:nvSpPr>
+        <p:spPr/>
+        <p:txBody>
+          <a:bodyPr/>
+          <a:lstStyle/>
+          <a:p>
+            <a:r>
+              <a:rPr lang="en-US" b="0" dirty="0"/>
+              <a:t>Outliers detected</a:t>
+            </a:r>
+            <a:endParaRPr lang="en-SG" dirty="0"/>
+          </a:p>
+        </p:txBody>
+      </p:sp>
+      <p:sp>
+        <p:nvSpPr>
+          <p:cNvPr id="4" name="Slide Number Placeholder 3">
+            <a:extLst>
+              <a:ext uri="{FF2B5EF4-FFF2-40B4-BE49-F238E27FC236}">
+                <a16:creationId xmlns:a16="http://schemas.microsoft.com/office/drawing/2014/main" id="{93A9FCE8-FC32-055C-21D9-EBE591D98646}"/>
+              </a:ext>
+            </a:extLst>
+          </p:cNvPr>
+          <p:cNvSpPr>
+            <a:spLocks noGrp="1"/>
+          </p:cNvSpPr>
+          <p:nvPr>
+            <p:ph type="sldNum" idx="4"/>
+          </p:nvPr>
+        </p:nvSpPr>
+        <p:spPr/>
+        <p:txBody>
+          <a:bodyPr/>
+          <a:lstStyle/>
+          <a:p>
+            <a:fld id="{00000000-1234-1234-1234-123412341234}" type="slidenum">
+              <a:rPr lang="en-SG" smtClean="0"/>
+              <a:pPr/>
+              <a:t>6</a:t>
+            </a:fld>
+            <a:endParaRPr lang="en-SG" dirty="0"/>
+          </a:p>
+        </p:txBody>
+      </p:sp>
+      <p:graphicFrame>
+        <p:nvGraphicFramePr>
+          <p:cNvPr id="6" name="Table 5">
+            <a:extLst>
+              <a:ext uri="{FF2B5EF4-FFF2-40B4-BE49-F238E27FC236}">
+                <a16:creationId xmlns:a16="http://schemas.microsoft.com/office/drawing/2014/main" id="{D0313F81-5BCF-8E13-363B-DBB134DFA902}"/>
+              </a:ext>
+            </a:extLst>
+          </p:cNvPr>
+          <p:cNvGraphicFramePr>
+            <a:graphicFrameLocks noGrp="1"/>
+          </p:cNvGraphicFramePr>
+          <p:nvPr>
+            <p:extLst>
+              <p:ext uri="{D42A27DB-BD31-4B8C-83A1-F6EECF244321}">
+                <p14:modId xmlns:p14="http://schemas.microsoft.com/office/powerpoint/2010/main" val="2516261529"/>
+              </p:ext>
+            </p:extLst>
+          </p:nvPr>
+        </p:nvGraphicFramePr>
+        <p:xfrm>
+          <a:off x="361601" y="1056765"/>
+          <a:ext cx="8420797" cy="2477262"/>
+        </p:xfrm>
+        <a:graphic>
+          <a:graphicData uri="http://schemas.openxmlformats.org/drawingml/2006/table">
+            <a:tbl>
+              <a:tblPr firstRow="1" bandRow="1">
+                <a:tableStyleId>{68D230F3-CF80-4859-8CE7-A43EE81993B5}</a:tableStyleId>
+              </a:tblPr>
+              <a:tblGrid>
+                <a:gridCol w="1026624">
+                  <a:extLst>
+                    <a:ext uri="{9D8B030D-6E8A-4147-A177-3AD203B41FA5}">
+                      <a16:colId xmlns:a16="http://schemas.microsoft.com/office/drawing/2014/main" val="1976745022"/>
+                    </a:ext>
+                  </a:extLst>
+                </a:gridCol>
+                <a:gridCol w="1404851">
+                  <a:extLst>
+                    <a:ext uri="{9D8B030D-6E8A-4147-A177-3AD203B41FA5}">
+                      <a16:colId xmlns:a16="http://schemas.microsoft.com/office/drawing/2014/main" val="3545215078"/>
+                    </a:ext>
+                  </a:extLst>
+                </a:gridCol>
+                <a:gridCol w="1177438">
                   <a:extLst>
                     <a:ext uri="{9D8B030D-6E8A-4147-A177-3AD203B41FA5}">
                       <a16:colId xmlns:a16="http://schemas.microsoft.com/office/drawing/2014/main" val="3582974769"/>
@@ -23469,11 +24611,11 @@
                         <a:buNone/>
                       </a:pPr>
                       <a:r>
-                        <a:rPr lang="en-SG" sz="1400" b="0" dirty="0">
+                        <a:rPr lang="en-SG" b="0" dirty="0">
                           <a:effectLst/>
                           <a:latin typeface="+mj-lt"/>
                         </a:rPr>
-                        <a:t>2017-10</a:t>
+                        <a:t>2020-07</a:t>
                       </a:r>
                     </a:p>
                   </a:txBody>
@@ -23497,11 +24639,11 @@
                         <a:buNone/>
                       </a:pPr>
                       <a:r>
-                        <a:rPr lang="en-SG" sz="1400" b="0">
+                        <a:rPr lang="en-SG" b="0" dirty="0">
                           <a:effectLst/>
                           <a:latin typeface="+mj-lt"/>
                         </a:rPr>
-                        <a:t>GEYLANG</a:t>
+                        <a:t>ANG MO KIO</a:t>
                       </a:r>
                     </a:p>
                   </a:txBody>
@@ -23525,7 +24667,7 @@
                         <a:buNone/>
                       </a:pPr>
                       <a:r>
-                        <a:rPr lang="en-SG" sz="1400" b="0" dirty="0">
+                        <a:rPr lang="en-SG" b="0" dirty="0">
                           <a:effectLst/>
                           <a:latin typeface="+mj-lt"/>
                         </a:rPr>
@@ -23553,11 +24695,11 @@
                         <a:buNone/>
                       </a:pPr>
                       <a:r>
-                        <a:rPr lang="en-SG" sz="1400" b="0">
+                        <a:rPr lang="en-SG" b="0">
                           <a:effectLst/>
                           <a:latin typeface="+mj-lt"/>
                         </a:rPr>
-                        <a:t>302</a:t>
+                        <a:t>507</a:t>
                       </a:r>
                     </a:p>
                   </a:txBody>
@@ -23581,11 +24723,11 @@
                         <a:buNone/>
                       </a:pPr>
                       <a:r>
-                        <a:rPr lang="en-SG" sz="1400" b="0">
+                        <a:rPr lang="en-SG" b="0">
                           <a:effectLst/>
                           <a:latin typeface="+mj-lt"/>
                         </a:rPr>
-                        <a:t>UBI AVE 1</a:t>
+                        <a:t>ANG MO KIO AVE 8</a:t>
                       </a:r>
                     </a:p>
                   </a:txBody>
@@ -23609,1157 +24751,15 @@
                         <a:buNone/>
                       </a:pPr>
                       <a:r>
-                        <a:rPr lang="en-SG" sz="1400" b="0" dirty="0">
+                        <a:rPr lang="en-SG" b="0">
                           <a:effectLst/>
                           <a:latin typeface="+mj-lt"/>
                         </a:rPr>
-                        <a:t>282000</a:t>
-                      </a:r>
-                    </a:p>
-                  </a:txBody>
-                  <a:tcPr marL="152400" marR="152400" marT="95250" marB="95250" anchor="ctr">
-                    <a:solidFill>
-                      <a:schemeClr val="bg1">
-                        <a:alpha val="20000"/>
-                      </a:schemeClr>
-                    </a:solidFill>
-                  </a:tcPr>
-                </a:tc>
-                <a:tc>
-                  <a:txBody>
-                    <a:bodyPr/>
-                    <a:lstStyle/>
-                    <a:p>
-                      <a:pPr algn="r">
-                        <a:lnSpc>
-                          <a:spcPts val="1875"/>
-                        </a:lnSpc>
-                        <a:buNone/>
-                      </a:pPr>
-                      <a:r>
-                        <a:rPr lang="en-SG" sz="1400" b="0">
-                          <a:effectLst/>
-                          <a:latin typeface="+mj-lt"/>
-                        </a:rPr>
-                        <a:t>8320</a:t>
+                        <a:t>174000.0</a:t>
                       </a:r>
                     </a:p>
                   </a:txBody>
                   <a:tcPr marL="152400" marT="95250" marB="95250" anchor="ctr">
-                    <a:solidFill>
-                      <a:schemeClr val="bg1">
-                        <a:alpha val="20000"/>
-                      </a:schemeClr>
-                    </a:solidFill>
-                  </a:tcPr>
-                </a:tc>
-                <a:extLst>
-                  <a:ext uri="{0D108BD9-81ED-4DB2-BD59-A6C34878D82A}">
-                    <a16:rowId xmlns:a16="http://schemas.microsoft.com/office/drawing/2014/main" val="2284305626"/>
-                  </a:ext>
-                </a:extLst>
-              </a:tr>
-              <a:tr h="370840">
-                <a:tc>
-                  <a:txBody>
-                    <a:bodyPr/>
-                    <a:lstStyle/>
-                    <a:p>
-                      <a:pPr algn="r">
-                        <a:lnSpc>
-                          <a:spcPts val="1875"/>
-                        </a:lnSpc>
-                        <a:buNone/>
-                      </a:pPr>
-                      <a:r>
-                        <a:rPr lang="en-SG" sz="1400" b="0">
-                          <a:effectLst/>
-                          <a:latin typeface="+mj-lt"/>
-                        </a:rPr>
-                        <a:t>2019-08</a:t>
-                      </a:r>
-                    </a:p>
-                  </a:txBody>
-                  <a:tcPr marR="152400" marT="95250" marB="95250" anchor="ctr"/>
-                </a:tc>
-                <a:tc>
-                  <a:txBody>
-                    <a:bodyPr/>
-                    <a:lstStyle/>
-                    <a:p>
-                      <a:pPr algn="r">
-                        <a:lnSpc>
-                          <a:spcPts val="1875"/>
-                        </a:lnSpc>
-                        <a:buNone/>
-                      </a:pPr>
-                      <a:r>
-                        <a:rPr lang="en-SG" sz="1400" b="0" dirty="0">
-                          <a:effectLst/>
-                          <a:latin typeface="+mj-lt"/>
-                        </a:rPr>
-                        <a:t>TAMPINES</a:t>
-                      </a:r>
-                    </a:p>
-                  </a:txBody>
-                  <a:tcPr marL="152400" marR="152400" marT="95250" marB="95250" anchor="ctr"/>
-                </a:tc>
-                <a:tc>
-                  <a:txBody>
-                    <a:bodyPr/>
-                    <a:lstStyle/>
-                    <a:p>
-                      <a:pPr algn="r">
-                        <a:lnSpc>
-                          <a:spcPts val="1875"/>
-                        </a:lnSpc>
-                        <a:buNone/>
-                      </a:pPr>
-                      <a:r>
-                        <a:rPr lang="en-SG" sz="1400" b="0" dirty="0">
-                          <a:effectLst/>
-                          <a:latin typeface="+mj-lt"/>
-                        </a:rPr>
-                        <a:t>3 ROOM</a:t>
-                      </a:r>
-                    </a:p>
-                  </a:txBody>
-                  <a:tcPr marL="152400" marR="152400" marT="95250" marB="95250" anchor="ctr"/>
-                </a:tc>
-                <a:tc>
-                  <a:txBody>
-                    <a:bodyPr/>
-                    <a:lstStyle/>
-                    <a:p>
-                      <a:pPr algn="r">
-                        <a:lnSpc>
-                          <a:spcPts val="1875"/>
-                        </a:lnSpc>
-                        <a:buNone/>
-                      </a:pPr>
-                      <a:r>
-                        <a:rPr lang="en-SG" sz="1400" b="0" dirty="0">
-                          <a:effectLst/>
-                          <a:latin typeface="+mj-lt"/>
-                        </a:rPr>
-                        <a:t>439</a:t>
-                      </a:r>
-                    </a:p>
-                  </a:txBody>
-                  <a:tcPr marL="152400" marR="152400" marT="95250" marB="95250" anchor="ctr"/>
-                </a:tc>
-                <a:tc>
-                  <a:txBody>
-                    <a:bodyPr/>
-                    <a:lstStyle/>
-                    <a:p>
-                      <a:pPr algn="r">
-                        <a:lnSpc>
-                          <a:spcPts val="1875"/>
-                        </a:lnSpc>
-                        <a:buNone/>
-                      </a:pPr>
-                      <a:r>
-                        <a:rPr lang="en-SG" sz="1400" b="0" dirty="0">
-                          <a:effectLst/>
-                          <a:latin typeface="+mj-lt"/>
-                        </a:rPr>
-                        <a:t>TAMPINES ST 43</a:t>
-                      </a:r>
-                    </a:p>
-                  </a:txBody>
-                  <a:tcPr marL="152400" marR="152400" marT="95250" marB="95250" anchor="ctr"/>
-                </a:tc>
-                <a:tc>
-                  <a:txBody>
-                    <a:bodyPr/>
-                    <a:lstStyle/>
-                    <a:p>
-                      <a:pPr algn="r">
-                        <a:lnSpc>
-                          <a:spcPts val="1875"/>
-                        </a:lnSpc>
-                        <a:buNone/>
-                      </a:pPr>
-                      <a:r>
-                        <a:rPr lang="en-SG" sz="1400" b="0" dirty="0">
-                          <a:effectLst/>
-                          <a:latin typeface="+mj-lt"/>
-                        </a:rPr>
-                        <a:t>275000</a:t>
-                      </a:r>
-                    </a:p>
-                  </a:txBody>
-                  <a:tcPr marL="152400" marR="152400" marT="95250" marB="95250" anchor="ctr"/>
-                </a:tc>
-                <a:tc>
-                  <a:txBody>
-                    <a:bodyPr/>
-                    <a:lstStyle/>
-                    <a:p>
-                      <a:pPr algn="r">
-                        <a:lnSpc>
-                          <a:spcPts val="1875"/>
-                        </a:lnSpc>
-                        <a:buNone/>
-                      </a:pPr>
-                      <a:r>
-                        <a:rPr lang="en-SG" sz="1400" b="0">
-                          <a:effectLst/>
-                          <a:latin typeface="+mj-lt"/>
-                        </a:rPr>
-                        <a:t>8187</a:t>
-                      </a:r>
-                    </a:p>
-                  </a:txBody>
-                  <a:tcPr marL="152400" marT="95250" marB="95250" anchor="ctr"/>
-                </a:tc>
-                <a:extLst>
-                  <a:ext uri="{0D108BD9-81ED-4DB2-BD59-A6C34878D82A}">
-                    <a16:rowId xmlns:a16="http://schemas.microsoft.com/office/drawing/2014/main" val="2474339768"/>
-                  </a:ext>
-                </a:extLst>
-              </a:tr>
-              <a:tr h="370840">
-                <a:tc>
-                  <a:txBody>
-                    <a:bodyPr/>
-                    <a:lstStyle/>
-                    <a:p>
-                      <a:pPr algn="r">
-                        <a:lnSpc>
-                          <a:spcPts val="1875"/>
-                        </a:lnSpc>
-                        <a:buNone/>
-                      </a:pPr>
-                      <a:r>
-                        <a:rPr lang="en-SG" sz="1400" b="0">
-                          <a:effectLst/>
-                          <a:latin typeface="+mj-lt"/>
-                        </a:rPr>
-                        <a:t>2017-07</a:t>
-                      </a:r>
-                    </a:p>
-                  </a:txBody>
-                  <a:tcPr marR="152400" marT="95250" marB="95250" anchor="ctr">
-                    <a:solidFill>
-                      <a:schemeClr val="bg1">
-                        <a:alpha val="20000"/>
-                      </a:schemeClr>
-                    </a:solidFill>
-                  </a:tcPr>
-                </a:tc>
-                <a:tc>
-                  <a:txBody>
-                    <a:bodyPr/>
-                    <a:lstStyle/>
-                    <a:p>
-                      <a:pPr algn="r">
-                        <a:lnSpc>
-                          <a:spcPts val="1875"/>
-                        </a:lnSpc>
-                        <a:buNone/>
-                      </a:pPr>
-                      <a:r>
-                        <a:rPr lang="en-SG" sz="1400" b="0">
-                          <a:effectLst/>
-                          <a:latin typeface="+mj-lt"/>
-                        </a:rPr>
-                        <a:t>TOA PAYOH</a:t>
-                      </a:r>
-                    </a:p>
-                  </a:txBody>
-                  <a:tcPr marL="152400" marR="152400" marT="95250" marB="95250" anchor="ctr">
-                    <a:solidFill>
-                      <a:schemeClr val="bg1">
-                        <a:alpha val="20000"/>
-                      </a:schemeClr>
-                    </a:solidFill>
-                  </a:tcPr>
-                </a:tc>
-                <a:tc>
-                  <a:txBody>
-                    <a:bodyPr/>
-                    <a:lstStyle/>
-                    <a:p>
-                      <a:pPr algn="r">
-                        <a:lnSpc>
-                          <a:spcPts val="1875"/>
-                        </a:lnSpc>
-                        <a:buNone/>
-                      </a:pPr>
-                      <a:r>
-                        <a:rPr lang="en-SG" sz="1400" b="0">
-                          <a:effectLst/>
-                          <a:latin typeface="+mj-lt"/>
-                        </a:rPr>
-                        <a:t>3 ROOM</a:t>
-                      </a:r>
-                    </a:p>
-                  </a:txBody>
-                  <a:tcPr marL="152400" marR="152400" marT="95250" marB="95250" anchor="ctr">
-                    <a:solidFill>
-                      <a:schemeClr val="bg1">
-                        <a:alpha val="20000"/>
-                      </a:schemeClr>
-                    </a:solidFill>
-                  </a:tcPr>
-                </a:tc>
-                <a:tc>
-                  <a:txBody>
-                    <a:bodyPr/>
-                    <a:lstStyle/>
-                    <a:p>
-                      <a:pPr algn="r">
-                        <a:lnSpc>
-                          <a:spcPts val="1875"/>
-                        </a:lnSpc>
-                        <a:buNone/>
-                      </a:pPr>
-                      <a:r>
-                        <a:rPr lang="en-SG" sz="1400" b="0">
-                          <a:effectLst/>
-                          <a:latin typeface="+mj-lt"/>
-                        </a:rPr>
-                        <a:t>113</a:t>
-                      </a:r>
-                    </a:p>
-                  </a:txBody>
-                  <a:tcPr marL="152400" marR="152400" marT="95250" marB="95250" anchor="ctr">
-                    <a:solidFill>
-                      <a:schemeClr val="bg1">
-                        <a:alpha val="20000"/>
-                      </a:schemeClr>
-                    </a:solidFill>
-                  </a:tcPr>
-                </a:tc>
-                <a:tc>
-                  <a:txBody>
-                    <a:bodyPr/>
-                    <a:lstStyle/>
-                    <a:p>
-                      <a:pPr algn="r">
-                        <a:lnSpc>
-                          <a:spcPts val="1875"/>
-                        </a:lnSpc>
-                        <a:buNone/>
-                      </a:pPr>
-                      <a:r>
-                        <a:rPr lang="en-SG" sz="1400" b="0">
-                          <a:effectLst/>
-                          <a:latin typeface="+mj-lt"/>
-                        </a:rPr>
-                        <a:t>LOR 1 TOA PAYOH</a:t>
-                      </a:r>
-                    </a:p>
-                  </a:txBody>
-                  <a:tcPr marL="152400" marR="152400" marT="95250" marB="95250" anchor="ctr">
-                    <a:solidFill>
-                      <a:schemeClr val="bg1">
-                        <a:alpha val="20000"/>
-                      </a:schemeClr>
-                    </a:solidFill>
-                  </a:tcPr>
-                </a:tc>
-                <a:tc>
-                  <a:txBody>
-                    <a:bodyPr/>
-                    <a:lstStyle/>
-                    <a:p>
-                      <a:pPr algn="r">
-                        <a:lnSpc>
-                          <a:spcPts val="1875"/>
-                        </a:lnSpc>
-                        <a:buNone/>
-                      </a:pPr>
-                      <a:r>
-                        <a:rPr lang="en-SG" sz="1400" b="0" dirty="0">
-                          <a:effectLst/>
-                          <a:latin typeface="+mj-lt"/>
-                        </a:rPr>
-                        <a:t>275000</a:t>
-                      </a:r>
-                    </a:p>
-                  </a:txBody>
-                  <a:tcPr marL="152400" marR="152400" marT="95250" marB="95250" anchor="ctr">
-                    <a:solidFill>
-                      <a:schemeClr val="bg1">
-                        <a:alpha val="20000"/>
-                      </a:schemeClr>
-                    </a:solidFill>
-                  </a:tcPr>
-                </a:tc>
-                <a:tc>
-                  <a:txBody>
-                    <a:bodyPr/>
-                    <a:lstStyle/>
-                    <a:p>
-                      <a:pPr algn="r">
-                        <a:lnSpc>
-                          <a:spcPts val="1875"/>
-                        </a:lnSpc>
-                        <a:buNone/>
-                      </a:pPr>
-                      <a:r>
-                        <a:rPr lang="en-SG" sz="1400" b="0">
-                          <a:effectLst/>
-                          <a:latin typeface="+mj-lt"/>
-                        </a:rPr>
-                        <a:t>8184</a:t>
-                      </a:r>
-                    </a:p>
-                  </a:txBody>
-                  <a:tcPr marL="152400" marT="95250" marB="95250" anchor="ctr">
-                    <a:solidFill>
-                      <a:schemeClr val="bg1">
-                        <a:alpha val="20000"/>
-                      </a:schemeClr>
-                    </a:solidFill>
-                  </a:tcPr>
-                </a:tc>
-                <a:extLst>
-                  <a:ext uri="{0D108BD9-81ED-4DB2-BD59-A6C34878D82A}">
-                    <a16:rowId xmlns:a16="http://schemas.microsoft.com/office/drawing/2014/main" val="2117236267"/>
-                  </a:ext>
-                </a:extLst>
-              </a:tr>
-              <a:tr h="370840">
-                <a:tc>
-                  <a:txBody>
-                    <a:bodyPr/>
-                    <a:lstStyle/>
-                    <a:p>
-                      <a:pPr algn="r">
-                        <a:lnSpc>
-                          <a:spcPts val="1875"/>
-                        </a:lnSpc>
-                        <a:buNone/>
-                      </a:pPr>
-                      <a:r>
-                        <a:rPr lang="en-SG" sz="1400" b="0">
-                          <a:effectLst/>
-                          <a:latin typeface="+mj-lt"/>
-                        </a:rPr>
-                        <a:t>2018-08</a:t>
-                      </a:r>
-                    </a:p>
-                  </a:txBody>
-                  <a:tcPr marR="152400" marT="95250" marB="95250" anchor="ctr"/>
-                </a:tc>
-                <a:tc>
-                  <a:txBody>
-                    <a:bodyPr/>
-                    <a:lstStyle/>
-                    <a:p>
-                      <a:pPr algn="r">
-                        <a:lnSpc>
-                          <a:spcPts val="1875"/>
-                        </a:lnSpc>
-                        <a:buNone/>
-                      </a:pPr>
-                      <a:r>
-                        <a:rPr lang="en-SG" sz="1400" b="0">
-                          <a:effectLst/>
-                          <a:latin typeface="+mj-lt"/>
-                        </a:rPr>
-                        <a:t>YISHUN</a:t>
-                      </a:r>
-                    </a:p>
-                  </a:txBody>
-                  <a:tcPr marL="152400" marR="152400" marT="95250" marB="95250" anchor="ctr"/>
-                </a:tc>
-                <a:tc>
-                  <a:txBody>
-                    <a:bodyPr/>
-                    <a:lstStyle/>
-                    <a:p>
-                      <a:pPr algn="r">
-                        <a:lnSpc>
-                          <a:spcPts val="1875"/>
-                        </a:lnSpc>
-                        <a:buNone/>
-                      </a:pPr>
-                      <a:r>
-                        <a:rPr lang="en-SG" sz="1400" b="0">
-                          <a:effectLst/>
-                          <a:latin typeface="+mj-lt"/>
-                        </a:rPr>
-                        <a:t>3 ROOM</a:t>
-                      </a:r>
-                    </a:p>
-                  </a:txBody>
-                  <a:tcPr marL="152400" marR="152400" marT="95250" marB="95250" anchor="ctr"/>
-                </a:tc>
-                <a:tc>
-                  <a:txBody>
-                    <a:bodyPr/>
-                    <a:lstStyle/>
-                    <a:p>
-                      <a:pPr algn="r">
-                        <a:lnSpc>
-                          <a:spcPts val="1875"/>
-                        </a:lnSpc>
-                        <a:buNone/>
-                      </a:pPr>
-                      <a:r>
-                        <a:rPr lang="en-SG" sz="1400" b="0">
-                          <a:effectLst/>
-                          <a:latin typeface="+mj-lt"/>
-                        </a:rPr>
-                        <a:t>719</a:t>
-                      </a:r>
-                    </a:p>
-                  </a:txBody>
-                  <a:tcPr marL="152400" marR="152400" marT="95250" marB="95250" anchor="ctr"/>
-                </a:tc>
-                <a:tc>
-                  <a:txBody>
-                    <a:bodyPr/>
-                    <a:lstStyle/>
-                    <a:p>
-                      <a:pPr algn="r">
-                        <a:lnSpc>
-                          <a:spcPts val="1875"/>
-                        </a:lnSpc>
-                        <a:buNone/>
-                      </a:pPr>
-                      <a:r>
-                        <a:rPr lang="en-SG" sz="1400" b="0" dirty="0">
-                          <a:effectLst/>
-                          <a:latin typeface="+mj-lt"/>
-                        </a:rPr>
-                        <a:t>YISHUN ST 71</a:t>
-                      </a:r>
-                    </a:p>
-                  </a:txBody>
-                  <a:tcPr marL="152400" marR="152400" marT="95250" marB="95250" anchor="ctr"/>
-                </a:tc>
-                <a:tc>
-                  <a:txBody>
-                    <a:bodyPr/>
-                    <a:lstStyle/>
-                    <a:p>
-                      <a:pPr algn="r">
-                        <a:lnSpc>
-                          <a:spcPts val="1875"/>
-                        </a:lnSpc>
-                        <a:buNone/>
-                      </a:pPr>
-                      <a:r>
-                        <a:rPr lang="en-SG" sz="1400" b="0" dirty="0">
-                          <a:effectLst/>
-                          <a:latin typeface="+mj-lt"/>
-                        </a:rPr>
-                        <a:t>275000</a:t>
-                      </a:r>
-                    </a:p>
-                  </a:txBody>
-                  <a:tcPr marL="152400" marR="152400" marT="95250" marB="95250" anchor="ctr"/>
-                </a:tc>
-                <a:tc>
-                  <a:txBody>
-                    <a:bodyPr/>
-                    <a:lstStyle/>
-                    <a:p>
-                      <a:pPr algn="r">
-                        <a:lnSpc>
-                          <a:spcPts val="1875"/>
-                        </a:lnSpc>
-                        <a:buNone/>
-                      </a:pPr>
-                      <a:r>
-                        <a:rPr lang="en-SG" sz="1400" b="0" dirty="0">
-                          <a:effectLst/>
-                          <a:latin typeface="+mj-lt"/>
-                        </a:rPr>
-                        <a:t>8183</a:t>
-                      </a:r>
-                    </a:p>
-                  </a:txBody>
-                  <a:tcPr marL="152400" marT="95250" marB="95250" anchor="ctr"/>
-                </a:tc>
-                <a:extLst>
-                  <a:ext uri="{0D108BD9-81ED-4DB2-BD59-A6C34878D82A}">
-                    <a16:rowId xmlns:a16="http://schemas.microsoft.com/office/drawing/2014/main" val="2026303842"/>
-                  </a:ext>
-                </a:extLst>
-              </a:tr>
-            </a:tbl>
-          </a:graphicData>
-        </a:graphic>
-      </p:graphicFrame>
-      <p:sp>
-        <p:nvSpPr>
-          <p:cNvPr id="8" name="TextBox 7">
-            <a:extLst>
-              <a:ext uri="{FF2B5EF4-FFF2-40B4-BE49-F238E27FC236}">
-                <a16:creationId xmlns:a16="http://schemas.microsoft.com/office/drawing/2014/main" id="{08A69FBC-3756-9D48-6CB4-084F949CF128}"/>
-              </a:ext>
-            </a:extLst>
-          </p:cNvPr>
-          <p:cNvSpPr txBox="1"/>
-          <p:nvPr/>
-        </p:nvSpPr>
-        <p:spPr>
-          <a:xfrm>
-            <a:off x="2285999" y="4086735"/>
-            <a:ext cx="4572000" cy="523220"/>
-          </a:xfrm>
-          <a:prstGeom prst="rect">
-            <a:avLst/>
-          </a:prstGeom>
-          <a:noFill/>
-        </p:spPr>
-        <p:txBody>
-          <a:bodyPr wrap="square">
-            <a:spAutoFit/>
-          </a:bodyPr>
-          <a:lstStyle/>
-          <a:p>
-            <a:pPr algn="l">
-              <a:spcBef>
-                <a:spcPts val="1200"/>
-              </a:spcBef>
-              <a:spcAft>
-                <a:spcPts val="1200"/>
-              </a:spcAft>
-            </a:pPr>
-            <a:r>
-              <a:rPr lang="en-US" b="0" i="0" dirty="0">
-                <a:solidFill>
-                  <a:schemeClr val="tx1"/>
-                </a:solidFill>
-                <a:effectLst/>
-                <a:latin typeface="+mn-lt"/>
-              </a:rPr>
-              <a:t>Interpretation</a:t>
-            </a:r>
-            <a:r>
-              <a:rPr lang="en-US" dirty="0">
-                <a:solidFill>
-                  <a:schemeClr val="tx1"/>
-                </a:solidFill>
-                <a:latin typeface="+mn-lt"/>
-              </a:rPr>
-              <a:t>: these properties serve as price benchmarks for their respective </a:t>
-            </a:r>
-            <a:r>
-              <a:rPr lang="en-US" b="1" dirty="0">
-                <a:solidFill>
-                  <a:schemeClr val="tx1"/>
-                </a:solidFill>
-                <a:latin typeface="+mn-lt"/>
-              </a:rPr>
-              <a:t>town</a:t>
-            </a:r>
-            <a:r>
-              <a:rPr lang="en-US" dirty="0">
-                <a:solidFill>
-                  <a:schemeClr val="tx1"/>
-                </a:solidFill>
-                <a:latin typeface="+mn-lt"/>
-              </a:rPr>
-              <a:t> and </a:t>
-            </a:r>
-            <a:r>
-              <a:rPr lang="en-US" b="1" dirty="0">
-                <a:solidFill>
-                  <a:schemeClr val="tx1"/>
-                </a:solidFill>
-                <a:latin typeface="+mn-lt"/>
-              </a:rPr>
-              <a:t>flat type</a:t>
-            </a:r>
-            <a:r>
-              <a:rPr lang="en-US" dirty="0">
-                <a:solidFill>
-                  <a:schemeClr val="tx1"/>
-                </a:solidFill>
-                <a:latin typeface="+mn-lt"/>
-              </a:rPr>
-              <a:t>.</a:t>
-            </a:r>
-            <a:endParaRPr lang="en-US" b="0" i="0" dirty="0">
-              <a:solidFill>
-                <a:schemeClr val="tx1"/>
-              </a:solidFill>
-              <a:effectLst/>
-              <a:latin typeface="+mn-lt"/>
-            </a:endParaRPr>
-          </a:p>
-        </p:txBody>
-      </p:sp>
-    </p:spTree>
-    <p:extLst>
-      <p:ext uri="{BB962C8B-B14F-4D97-AF65-F5344CB8AC3E}">
-        <p14:creationId xmlns:p14="http://schemas.microsoft.com/office/powerpoint/2010/main" val="1865239740"/>
-      </p:ext>
-    </p:extLst>
-  </p:cSld>
-  <p:clrMapOvr>
-    <a:masterClrMapping/>
-  </p:clrMapOvr>
-</p:sld>
-</file>
-
-<file path=ppt/slides/slide6.xml><?xml version="1.0" encoding="utf-8"?>
-<p:sld xmlns:a="http://schemas.openxmlformats.org/drawingml/2006/main" xmlns:r="http://schemas.openxmlformats.org/officeDocument/2006/relationships" xmlns:p="http://schemas.openxmlformats.org/presentationml/2006/main">
-  <p:cSld>
-    <p:spTree>
-      <p:nvGrpSpPr>
-        <p:cNvPr id="1" name="">
-          <a:extLst>
-            <a:ext uri="{FF2B5EF4-FFF2-40B4-BE49-F238E27FC236}">
-              <a16:creationId xmlns:a16="http://schemas.microsoft.com/office/drawing/2014/main" id="{88D2EB96-7036-13FD-EBE3-14566A819859}"/>
-            </a:ext>
-          </a:extLst>
-        </p:cNvPr>
-        <p:cNvGrpSpPr/>
-        <p:nvPr/>
-      </p:nvGrpSpPr>
-      <p:grpSpPr>
-        <a:xfrm>
-          <a:off x="0" y="0"/>
-          <a:ext cx="0" cy="0"/>
-          <a:chOff x="0" y="0"/>
-          <a:chExt cx="0" cy="0"/>
-        </a:xfrm>
-      </p:grpSpPr>
-      <p:sp>
-        <p:nvSpPr>
-          <p:cNvPr id="2" name="Title 1">
-            <a:extLst>
-              <a:ext uri="{FF2B5EF4-FFF2-40B4-BE49-F238E27FC236}">
-                <a16:creationId xmlns:a16="http://schemas.microsoft.com/office/drawing/2014/main" id="{309C311B-0D57-07BD-3DC5-C7BC0B961AB9}"/>
-              </a:ext>
-            </a:extLst>
-          </p:cNvPr>
-          <p:cNvSpPr>
-            <a:spLocks noGrp="1"/>
-          </p:cNvSpPr>
-          <p:nvPr>
-            <p:ph type="title"/>
-          </p:nvPr>
-        </p:nvSpPr>
-        <p:spPr/>
-        <p:txBody>
-          <a:bodyPr/>
-          <a:lstStyle/>
-          <a:p>
-            <a:r>
-              <a:rPr lang="en-US" b="0" dirty="0"/>
-              <a:t>Outliers detected</a:t>
-            </a:r>
-            <a:endParaRPr lang="en-SG" dirty="0"/>
-          </a:p>
-        </p:txBody>
-      </p:sp>
-      <p:sp>
-        <p:nvSpPr>
-          <p:cNvPr id="4" name="Slide Number Placeholder 3">
-            <a:extLst>
-              <a:ext uri="{FF2B5EF4-FFF2-40B4-BE49-F238E27FC236}">
-                <a16:creationId xmlns:a16="http://schemas.microsoft.com/office/drawing/2014/main" id="{93A9FCE8-FC32-055C-21D9-EBE591D98646}"/>
-              </a:ext>
-            </a:extLst>
-          </p:cNvPr>
-          <p:cNvSpPr>
-            <a:spLocks noGrp="1"/>
-          </p:cNvSpPr>
-          <p:nvPr>
-            <p:ph type="sldNum" idx="4"/>
-          </p:nvPr>
-        </p:nvSpPr>
-        <p:spPr/>
-        <p:txBody>
-          <a:bodyPr/>
-          <a:lstStyle/>
-          <a:p>
-            <a:fld id="{00000000-1234-1234-1234-123412341234}" type="slidenum">
-              <a:rPr lang="en-SG" smtClean="0"/>
-              <a:pPr/>
-              <a:t>6</a:t>
-            </a:fld>
-            <a:endParaRPr lang="en-SG" dirty="0"/>
-          </a:p>
-        </p:txBody>
-      </p:sp>
-      <p:graphicFrame>
-        <p:nvGraphicFramePr>
-          <p:cNvPr id="6" name="Table 5">
-            <a:extLst>
-              <a:ext uri="{FF2B5EF4-FFF2-40B4-BE49-F238E27FC236}">
-                <a16:creationId xmlns:a16="http://schemas.microsoft.com/office/drawing/2014/main" id="{D0313F81-5BCF-8E13-363B-DBB134DFA902}"/>
-              </a:ext>
-            </a:extLst>
-          </p:cNvPr>
-          <p:cNvGraphicFramePr>
-            <a:graphicFrameLocks noGrp="1"/>
-          </p:cNvGraphicFramePr>
-          <p:nvPr>
-            <p:extLst>
-              <p:ext uri="{D42A27DB-BD31-4B8C-83A1-F6EECF244321}">
-                <p14:modId xmlns:p14="http://schemas.microsoft.com/office/powerpoint/2010/main" val="2322826183"/>
-              </p:ext>
-            </p:extLst>
-          </p:nvPr>
-        </p:nvGraphicFramePr>
-        <p:xfrm>
-          <a:off x="361601" y="1056765"/>
-          <a:ext cx="8420797" cy="3371596"/>
-        </p:xfrm>
-        <a:graphic>
-          <a:graphicData uri="http://schemas.openxmlformats.org/drawingml/2006/table">
-            <a:tbl>
-              <a:tblPr firstRow="1" bandRow="1">
-                <a:tableStyleId>{68D230F3-CF80-4859-8CE7-A43EE81993B5}</a:tableStyleId>
-              </a:tblPr>
-              <a:tblGrid>
-                <a:gridCol w="1202971">
-                  <a:extLst>
-                    <a:ext uri="{9D8B030D-6E8A-4147-A177-3AD203B41FA5}">
-                      <a16:colId xmlns:a16="http://schemas.microsoft.com/office/drawing/2014/main" val="1976745022"/>
-                    </a:ext>
-                  </a:extLst>
-                </a:gridCol>
-                <a:gridCol w="1202971">
-                  <a:extLst>
-                    <a:ext uri="{9D8B030D-6E8A-4147-A177-3AD203B41FA5}">
-                      <a16:colId xmlns:a16="http://schemas.microsoft.com/office/drawing/2014/main" val="3545215078"/>
-                    </a:ext>
-                  </a:extLst>
-                </a:gridCol>
-                <a:gridCol w="1202971">
-                  <a:extLst>
-                    <a:ext uri="{9D8B030D-6E8A-4147-A177-3AD203B41FA5}">
-                      <a16:colId xmlns:a16="http://schemas.microsoft.com/office/drawing/2014/main" val="3582974769"/>
-                    </a:ext>
-                  </a:extLst>
-                </a:gridCol>
-                <a:gridCol w="1202971">
-                  <a:extLst>
-                    <a:ext uri="{9D8B030D-6E8A-4147-A177-3AD203B41FA5}">
-                      <a16:colId xmlns:a16="http://schemas.microsoft.com/office/drawing/2014/main" val="1072944167"/>
-                    </a:ext>
-                  </a:extLst>
-                </a:gridCol>
-                <a:gridCol w="1202971">
-                  <a:extLst>
-                    <a:ext uri="{9D8B030D-6E8A-4147-A177-3AD203B41FA5}">
-                      <a16:colId xmlns:a16="http://schemas.microsoft.com/office/drawing/2014/main" val="3814309874"/>
-                    </a:ext>
-                  </a:extLst>
-                </a:gridCol>
-                <a:gridCol w="1202971">
-                  <a:extLst>
-                    <a:ext uri="{9D8B030D-6E8A-4147-A177-3AD203B41FA5}">
-                      <a16:colId xmlns:a16="http://schemas.microsoft.com/office/drawing/2014/main" val="438397181"/>
-                    </a:ext>
-                  </a:extLst>
-                </a:gridCol>
-                <a:gridCol w="1202971">
-                  <a:extLst>
-                    <a:ext uri="{9D8B030D-6E8A-4147-A177-3AD203B41FA5}">
-                      <a16:colId xmlns:a16="http://schemas.microsoft.com/office/drawing/2014/main" val="1298811898"/>
-                    </a:ext>
-                  </a:extLst>
-                </a:gridCol>
-              </a:tblGrid>
-              <a:tr h="370840">
-                <a:tc>
-                  <a:txBody>
-                    <a:bodyPr/>
-                    <a:lstStyle/>
-                    <a:p>
-                      <a:r>
-                        <a:rPr lang="en-US" sz="1400" dirty="0">
-                          <a:latin typeface="+mj-lt"/>
-                        </a:rPr>
-                        <a:t>Date</a:t>
-                      </a:r>
-                      <a:endParaRPr lang="en-SG" sz="1400" dirty="0">
-                        <a:latin typeface="+mj-lt"/>
-                      </a:endParaRPr>
-                    </a:p>
-                  </a:txBody>
-                  <a:tcPr/>
-                </a:tc>
-                <a:tc>
-                  <a:txBody>
-                    <a:bodyPr/>
-                    <a:lstStyle/>
-                    <a:p>
-                      <a:r>
-                        <a:rPr lang="en-US" sz="1400" dirty="0">
-                          <a:latin typeface="+mj-lt"/>
-                        </a:rPr>
-                        <a:t>Town</a:t>
-                      </a:r>
-                      <a:endParaRPr lang="en-SG" sz="1400" dirty="0">
-                        <a:latin typeface="+mj-lt"/>
-                      </a:endParaRPr>
-                    </a:p>
-                  </a:txBody>
-                  <a:tcPr/>
-                </a:tc>
-                <a:tc>
-                  <a:txBody>
-                    <a:bodyPr/>
-                    <a:lstStyle/>
-                    <a:p>
-                      <a:r>
-                        <a:rPr lang="en-US" sz="1400" dirty="0">
-                          <a:latin typeface="+mj-lt"/>
-                        </a:rPr>
-                        <a:t>Flat Type</a:t>
-                      </a:r>
-                      <a:endParaRPr lang="en-SG" sz="1400" dirty="0">
-                        <a:latin typeface="+mj-lt"/>
-                      </a:endParaRPr>
-                    </a:p>
-                  </a:txBody>
-                  <a:tcPr/>
-                </a:tc>
-                <a:tc>
-                  <a:txBody>
-                    <a:bodyPr/>
-                    <a:lstStyle/>
-                    <a:p>
-                      <a:r>
-                        <a:rPr lang="en-US" sz="1400" dirty="0">
-                          <a:latin typeface="+mj-lt"/>
-                        </a:rPr>
-                        <a:t>Block</a:t>
-                      </a:r>
-                      <a:endParaRPr lang="en-SG" sz="1400" dirty="0">
-                        <a:latin typeface="+mj-lt"/>
-                      </a:endParaRPr>
-                    </a:p>
-                  </a:txBody>
-                  <a:tcPr/>
-                </a:tc>
-                <a:tc>
-                  <a:txBody>
-                    <a:bodyPr/>
-                    <a:lstStyle/>
-                    <a:p>
-                      <a:r>
-                        <a:rPr lang="en-US" sz="1400" dirty="0">
-                          <a:latin typeface="+mj-lt"/>
-                        </a:rPr>
-                        <a:t>Street Name</a:t>
-                      </a:r>
-                      <a:endParaRPr lang="en-SG" sz="1400" dirty="0">
-                        <a:latin typeface="+mj-lt"/>
-                      </a:endParaRPr>
-                    </a:p>
-                  </a:txBody>
-                  <a:tcPr/>
-                </a:tc>
-                <a:tc>
-                  <a:txBody>
-                    <a:bodyPr/>
-                    <a:lstStyle/>
-                    <a:p>
-                      <a:r>
-                        <a:rPr lang="en-US" sz="1400" dirty="0">
-                          <a:latin typeface="+mj-lt"/>
-                        </a:rPr>
-                        <a:t>Resale price</a:t>
-                      </a:r>
-                      <a:endParaRPr lang="en-SG" sz="1400" dirty="0">
-                        <a:latin typeface="+mj-lt"/>
-                      </a:endParaRPr>
-                    </a:p>
-                  </a:txBody>
-                  <a:tcPr/>
-                </a:tc>
-                <a:tc>
-                  <a:txBody>
-                    <a:bodyPr/>
-                    <a:lstStyle/>
-                    <a:p>
-                      <a:r>
-                        <a:rPr lang="en-US" sz="1400" dirty="0">
-                          <a:latin typeface="+mj-lt"/>
-                        </a:rPr>
-                        <a:t>Number of connections</a:t>
-                      </a:r>
-                      <a:endParaRPr lang="en-SG" sz="1400" dirty="0">
-                        <a:latin typeface="+mj-lt"/>
-                      </a:endParaRPr>
-                    </a:p>
-                  </a:txBody>
-                  <a:tcPr/>
-                </a:tc>
-                <a:extLst>
-                  <a:ext uri="{0D108BD9-81ED-4DB2-BD59-A6C34878D82A}">
-                    <a16:rowId xmlns:a16="http://schemas.microsoft.com/office/drawing/2014/main" val="2259017882"/>
-                  </a:ext>
-                </a:extLst>
-              </a:tr>
-              <a:tr h="370840">
-                <a:tc>
-                  <a:txBody>
-                    <a:bodyPr/>
-                    <a:lstStyle/>
-                    <a:p>
-                      <a:pPr algn="r">
-                        <a:lnSpc>
-                          <a:spcPts val="1875"/>
-                        </a:lnSpc>
-                        <a:buNone/>
-                      </a:pPr>
-                      <a:r>
-                        <a:rPr lang="en-SG" sz="1400" b="0">
-                          <a:effectLst/>
-                          <a:latin typeface="+mn-lt"/>
-                        </a:rPr>
-                        <a:t>2020-05</a:t>
-                      </a:r>
-                    </a:p>
-                  </a:txBody>
-                  <a:tcPr marR="152400" marT="95250" marB="95250" anchor="ctr">
-                    <a:solidFill>
-                      <a:schemeClr val="bg1">
-                        <a:alpha val="20000"/>
-                      </a:schemeClr>
-                    </a:solidFill>
-                  </a:tcPr>
-                </a:tc>
-                <a:tc>
-                  <a:txBody>
-                    <a:bodyPr/>
-                    <a:lstStyle/>
-                    <a:p>
-                      <a:pPr algn="r">
-                        <a:lnSpc>
-                          <a:spcPts val="1875"/>
-                        </a:lnSpc>
-                        <a:buNone/>
-                      </a:pPr>
-                      <a:r>
-                        <a:rPr lang="en-SG" sz="1400" b="0">
-                          <a:effectLst/>
-                          <a:latin typeface="+mn-lt"/>
-                        </a:rPr>
-                        <a:t>ANG MO KIO</a:t>
-                      </a:r>
-                    </a:p>
-                  </a:txBody>
-                  <a:tcPr marL="152400" marR="152400" marT="95250" marB="95250" anchor="ctr">
-                    <a:solidFill>
-                      <a:schemeClr val="bg1">
-                        <a:alpha val="20000"/>
-                      </a:schemeClr>
-                    </a:solidFill>
-                  </a:tcPr>
-                </a:tc>
-                <a:tc>
-                  <a:txBody>
-                    <a:bodyPr/>
-                    <a:lstStyle/>
-                    <a:p>
-                      <a:pPr algn="r">
-                        <a:lnSpc>
-                          <a:spcPts val="1875"/>
-                        </a:lnSpc>
-                        <a:buNone/>
-                      </a:pPr>
-                      <a:r>
-                        <a:rPr lang="en-SG" sz="1400" b="0">
-                          <a:effectLst/>
-                          <a:latin typeface="+mn-lt"/>
-                        </a:rPr>
-                        <a:t>EXECUTIVE</a:t>
-                      </a:r>
-                    </a:p>
-                  </a:txBody>
-                  <a:tcPr marL="152400" marR="152400" marT="95250" marB="95250" anchor="ctr">
-                    <a:solidFill>
-                      <a:schemeClr val="bg1">
-                        <a:alpha val="20000"/>
-                      </a:schemeClr>
-                    </a:solidFill>
-                  </a:tcPr>
-                </a:tc>
-                <a:tc>
-                  <a:txBody>
-                    <a:bodyPr/>
-                    <a:lstStyle/>
-                    <a:p>
-                      <a:pPr algn="r">
-                        <a:lnSpc>
-                          <a:spcPts val="1875"/>
-                        </a:lnSpc>
-                        <a:buNone/>
-                      </a:pPr>
-                      <a:r>
-                        <a:rPr lang="en-SG" sz="1400" b="0">
-                          <a:effectLst/>
-                          <a:latin typeface="+mn-lt"/>
-                        </a:rPr>
-                        <a:t>608</a:t>
-                      </a:r>
-                    </a:p>
-                  </a:txBody>
-                  <a:tcPr marL="152400" marR="152400" marT="95250" marB="95250" anchor="ctr">
-                    <a:solidFill>
-                      <a:schemeClr val="bg1">
-                        <a:alpha val="20000"/>
-                      </a:schemeClr>
-                    </a:solidFill>
-                  </a:tcPr>
-                </a:tc>
-                <a:tc>
-                  <a:txBody>
-                    <a:bodyPr/>
-                    <a:lstStyle/>
-                    <a:p>
-                      <a:pPr algn="r">
-                        <a:lnSpc>
-                          <a:spcPts val="1875"/>
-                        </a:lnSpc>
-                        <a:buNone/>
-                      </a:pPr>
-                      <a:r>
-                        <a:rPr lang="en-SG" sz="1400" b="0">
-                          <a:effectLst/>
-                          <a:latin typeface="+mn-lt"/>
-                        </a:rPr>
-                        <a:t>ANG MO KIO AVE 5</a:t>
-                      </a:r>
-                    </a:p>
-                  </a:txBody>
-                  <a:tcPr marL="152400" marR="152400" marT="95250" marB="95250" anchor="ctr">
-                    <a:solidFill>
-                      <a:schemeClr val="bg1">
-                        <a:alpha val="20000"/>
-                      </a:schemeClr>
-                    </a:solidFill>
-                  </a:tcPr>
-                </a:tc>
-                <a:tc>
-                  <a:txBody>
-                    <a:bodyPr/>
-                    <a:lstStyle/>
-                    <a:p>
-                      <a:pPr algn="r">
-                        <a:lnSpc>
-                          <a:spcPts val="1875"/>
-                        </a:lnSpc>
-                        <a:buNone/>
-                      </a:pPr>
-                      <a:r>
-                        <a:rPr lang="en-SG" sz="1400" b="0" dirty="0">
-                          <a:effectLst/>
-                          <a:latin typeface="+mn-lt"/>
-                        </a:rPr>
-                        <a:t>1030000</a:t>
-                      </a:r>
-                    </a:p>
-                  </a:txBody>
-                  <a:tcPr marL="152400" marR="152400" marT="95250" marB="95250" anchor="ctr">
                     <a:solidFill>
                       <a:schemeClr val="bg1">
                         <a:alpha val="20000"/>
@@ -24814,11 +24814,11 @@
                         <a:buNone/>
                       </a:pPr>
                       <a:r>
-                        <a:rPr lang="en-SG" sz="1400" b="0">
+                        <a:rPr lang="en-SG" b="0">
                           <a:effectLst/>
-                          <a:latin typeface="+mn-lt"/>
+                          <a:latin typeface="+mj-lt"/>
                         </a:rPr>
-                        <a:t>2017-11</a:t>
+                        <a:t>2018-07</a:t>
                       </a:r>
                     </a:p>
                   </a:txBody>
@@ -24836,11 +24836,11 @@
                         <a:buNone/>
                       </a:pPr>
                       <a:r>
-                        <a:rPr lang="en-SG" sz="1400" b="0">
+                        <a:rPr lang="en-SG" b="0">
                           <a:effectLst/>
-                          <a:latin typeface="+mn-lt"/>
+                          <a:latin typeface="+mj-lt"/>
                         </a:rPr>
-                        <a:t>BEDOK</a:t>
+                        <a:t>ANG MO KIO</a:t>
                       </a:r>
                     </a:p>
                   </a:txBody>
@@ -24858,11 +24858,11 @@
                         <a:buNone/>
                       </a:pPr>
                       <a:r>
-                        <a:rPr lang="en-SG" sz="1400" b="0">
+                        <a:rPr lang="en-SG" b="0">
                           <a:effectLst/>
-                          <a:latin typeface="+mn-lt"/>
+                          <a:latin typeface="+mj-lt"/>
                         </a:rPr>
-                        <a:t>EXECUTIVE</a:t>
+                        <a:t>5 ROOM</a:t>
                       </a:r>
                     </a:p>
                   </a:txBody>
@@ -24880,11 +24880,11 @@
                         <a:buNone/>
                       </a:pPr>
                       <a:r>
-                        <a:rPr lang="en-SG" sz="1400" b="0">
+                        <a:rPr lang="en-SG" b="0" dirty="0">
                           <a:effectLst/>
-                          <a:latin typeface="+mn-lt"/>
+                          <a:latin typeface="+mj-lt"/>
                         </a:rPr>
-                        <a:t>33</a:t>
+                        <a:t>644</a:t>
                       </a:r>
                     </a:p>
                   </a:txBody>
@@ -24902,11 +24902,11 @@
                         <a:buNone/>
                       </a:pPr>
                       <a:r>
-                        <a:rPr lang="en-SG" sz="1400" b="0">
+                        <a:rPr lang="en-SG" b="0" dirty="0">
                           <a:effectLst/>
-                          <a:latin typeface="+mn-lt"/>
+                          <a:latin typeface="+mj-lt"/>
                         </a:rPr>
-                        <a:t>BEDOK STH AVE 2</a:t>
+                        <a:t>ANG MO KIO AVE 4</a:t>
                       </a:r>
                     </a:p>
                   </a:txBody>
@@ -24924,15 +24924,15 @@
                         <a:buNone/>
                       </a:pPr>
                       <a:r>
-                        <a:rPr lang="en-SG" sz="1400" b="0" dirty="0">
+                        <a:rPr lang="en-SG" b="0">
                           <a:effectLst/>
-                          <a:latin typeface="+mn-lt"/>
+                          <a:latin typeface="+mj-lt"/>
                         </a:rPr>
-                        <a:t>815000</a:t>
+                        <a:t>688888.0</a:t>
                       </a:r>
                     </a:p>
                   </a:txBody>
-                  <a:tcPr marL="152400" marR="152400" marT="95250" marB="95250" anchor="ctr"/>
+                  <a:tcPr marL="152400" marT="95250" marB="95250" anchor="ctr"/>
                 </a:tc>
                 <a:tc>
                   <a:txBody>
@@ -24975,11 +24975,11 @@
                         <a:buNone/>
                       </a:pPr>
                       <a:r>
-                        <a:rPr lang="en-SG" sz="1400" b="0" dirty="0">
+                        <a:rPr lang="en-SG" b="0">
                           <a:effectLst/>
-                          <a:latin typeface="+mn-lt"/>
+                          <a:latin typeface="+mj-lt"/>
                         </a:rPr>
-                        <a:t>2019-06</a:t>
+                        <a:t>2020-05</a:t>
                       </a:r>
                     </a:p>
                   </a:txBody>
@@ -25003,11 +25003,11 @@
                         <a:buNone/>
                       </a:pPr>
                       <a:r>
-                        <a:rPr lang="en-SG" sz="1400" b="0">
+                        <a:rPr lang="en-SG" b="0">
                           <a:effectLst/>
-                          <a:latin typeface="+mn-lt"/>
+                          <a:latin typeface="+mj-lt"/>
                         </a:rPr>
-                        <a:t>BISHAN</a:t>
+                        <a:t>ANG MO KIO</a:t>
                       </a:r>
                     </a:p>
                   </a:txBody>
@@ -25031,11 +25031,11 @@
                         <a:buNone/>
                       </a:pPr>
                       <a:r>
-                        <a:rPr lang="en-SG" sz="1400" b="0">
+                        <a:rPr lang="en-SG" b="0">
                           <a:effectLst/>
-                          <a:latin typeface="+mn-lt"/>
+                          <a:latin typeface="+mj-lt"/>
                         </a:rPr>
-                        <a:t>MULTI-GENERATION</a:t>
+                        <a:t>EXECUTIVE</a:t>
                       </a:r>
                     </a:p>
                   </a:txBody>
@@ -25059,11 +25059,11 @@
                         <a:buNone/>
                       </a:pPr>
                       <a:r>
-                        <a:rPr lang="en-SG" sz="1400" b="0">
+                        <a:rPr lang="en-SG" b="0">
                           <a:effectLst/>
-                          <a:latin typeface="+mn-lt"/>
+                          <a:latin typeface="+mj-lt"/>
                         </a:rPr>
-                        <a:t>137</a:t>
+                        <a:t>608</a:t>
                       </a:r>
                     </a:p>
                   </a:txBody>
@@ -25087,11 +25087,11 @@
                         <a:buNone/>
                       </a:pPr>
                       <a:r>
-                        <a:rPr lang="en-SG" sz="1400" b="0">
+                        <a:rPr lang="en-SG" b="0" dirty="0">
                           <a:effectLst/>
-                          <a:latin typeface="+mn-lt"/>
+                          <a:latin typeface="+mj-lt"/>
                         </a:rPr>
-                        <a:t>BISHAN ST 12</a:t>
+                        <a:t>ANG MO KIO AVE 5</a:t>
                       </a:r>
                     </a:p>
                   </a:txBody>
@@ -25115,15 +25115,15 @@
                         <a:buNone/>
                       </a:pPr>
                       <a:r>
-                        <a:rPr lang="en-SG" sz="1400" b="0" dirty="0">
+                        <a:rPr lang="en-SG" b="0" dirty="0">
                           <a:effectLst/>
-                          <a:latin typeface="+mn-lt"/>
+                          <a:latin typeface="+mj-lt"/>
                         </a:rPr>
-                        <a:t>840000</a:t>
+                        <a:t>1030000.0</a:t>
                       </a:r>
                     </a:p>
                   </a:txBody>
-                  <a:tcPr marL="152400" marR="152400" marT="95250" marB="95250" anchor="ctr">
+                  <a:tcPr marL="152400" marT="95250" marB="95250" anchor="ctr">
                     <a:solidFill>
                       <a:schemeClr val="bg1">
                         <a:alpha val="20000"/>
@@ -25143,7 +25143,7 @@
                         <a:buNone/>
                       </a:pPr>
                       <a:r>
-                        <a:rPr lang="en-SG" sz="1400" b="0">
+                        <a:rPr lang="en-SG" sz="1400" b="0" dirty="0">
                           <a:effectLst/>
                           <a:latin typeface="+mn-lt"/>
                         </a:rPr>
@@ -25165,167 +25165,6 @@
                   </a:ext>
                 </a:extLst>
               </a:tr>
-              <a:tr h="370840">
-                <a:tc>
-                  <a:txBody>
-                    <a:bodyPr/>
-                    <a:lstStyle/>
-                    <a:p>
-                      <a:pPr algn="r">
-                        <a:lnSpc>
-                          <a:spcPts val="1875"/>
-                        </a:lnSpc>
-                        <a:buNone/>
-                      </a:pPr>
-                      <a:r>
-                        <a:rPr lang="en-SG" sz="1400" b="0" dirty="0">
-                          <a:effectLst/>
-                          <a:latin typeface="+mn-lt"/>
-                        </a:rPr>
-                        <a:t>2020-08</a:t>
-                      </a:r>
-                    </a:p>
-                  </a:txBody>
-                  <a:tcPr marR="152400" marT="95250" marB="95250" anchor="ctr"/>
-                </a:tc>
-                <a:tc>
-                  <a:txBody>
-                    <a:bodyPr/>
-                    <a:lstStyle/>
-                    <a:p>
-                      <a:pPr algn="r">
-                        <a:lnSpc>
-                          <a:spcPts val="1875"/>
-                        </a:lnSpc>
-                        <a:buNone/>
-                      </a:pPr>
-                      <a:r>
-                        <a:rPr lang="en-SG" sz="1400" b="0">
-                          <a:effectLst/>
-                          <a:latin typeface="+mn-lt"/>
-                        </a:rPr>
-                        <a:t>BUKIT MERAH</a:t>
-                      </a:r>
-                    </a:p>
-                  </a:txBody>
-                  <a:tcPr marL="152400" marR="152400" marT="95250" marB="95250" anchor="ctr"/>
-                </a:tc>
-                <a:tc>
-                  <a:txBody>
-                    <a:bodyPr/>
-                    <a:lstStyle/>
-                    <a:p>
-                      <a:pPr algn="r">
-                        <a:lnSpc>
-                          <a:spcPts val="1875"/>
-                        </a:lnSpc>
-                        <a:buNone/>
-                      </a:pPr>
-                      <a:r>
-                        <a:rPr lang="en-SG" sz="1400" b="0">
-                          <a:effectLst/>
-                          <a:latin typeface="+mn-lt"/>
-                        </a:rPr>
-                        <a:t>4 ROOM</a:t>
-                      </a:r>
-                    </a:p>
-                  </a:txBody>
-                  <a:tcPr marL="152400" marR="152400" marT="95250" marB="95250" anchor="ctr"/>
-                </a:tc>
-                <a:tc>
-                  <a:txBody>
-                    <a:bodyPr/>
-                    <a:lstStyle/>
-                    <a:p>
-                      <a:pPr algn="r">
-                        <a:lnSpc>
-                          <a:spcPts val="1875"/>
-                        </a:lnSpc>
-                        <a:buNone/>
-                      </a:pPr>
-                      <a:r>
-                        <a:rPr lang="en-SG" sz="1400" b="0" dirty="0">
-                          <a:effectLst/>
-                          <a:latin typeface="+mn-lt"/>
-                        </a:rPr>
-                        <a:t>43</a:t>
-                      </a:r>
-                    </a:p>
-                  </a:txBody>
-                  <a:tcPr marL="152400" marR="152400" marT="95250" marB="95250" anchor="ctr"/>
-                </a:tc>
-                <a:tc>
-                  <a:txBody>
-                    <a:bodyPr/>
-                    <a:lstStyle/>
-                    <a:p>
-                      <a:pPr algn="r">
-                        <a:lnSpc>
-                          <a:spcPts val="1875"/>
-                        </a:lnSpc>
-                        <a:buNone/>
-                      </a:pPr>
-                      <a:r>
-                        <a:rPr lang="en-SG" sz="1400" b="0">
-                          <a:effectLst/>
-                          <a:latin typeface="+mn-lt"/>
-                        </a:rPr>
-                        <a:t>MOH GUAN TER</a:t>
-                      </a:r>
-                    </a:p>
-                  </a:txBody>
-                  <a:tcPr marL="152400" marR="152400" marT="95250" marB="95250" anchor="ctr"/>
-                </a:tc>
-                <a:tc>
-                  <a:txBody>
-                    <a:bodyPr/>
-                    <a:lstStyle/>
-                    <a:p>
-                      <a:pPr algn="r">
-                        <a:lnSpc>
-                          <a:spcPts val="1875"/>
-                        </a:lnSpc>
-                        <a:buNone/>
-                      </a:pPr>
-                      <a:r>
-                        <a:rPr lang="en-SG" sz="1400" b="0" dirty="0">
-                          <a:effectLst/>
-                          <a:latin typeface="+mn-lt"/>
-                        </a:rPr>
-                        <a:t>1088000</a:t>
-                      </a:r>
-                    </a:p>
-                  </a:txBody>
-                  <a:tcPr marL="152400" marR="152400" marT="95250" marB="95250" anchor="ctr"/>
-                </a:tc>
-                <a:tc>
-                  <a:txBody>
-                    <a:bodyPr/>
-                    <a:lstStyle/>
-                    <a:p>
-                      <a:pPr algn="r">
-                        <a:lnSpc>
-                          <a:spcPts val="1875"/>
-                        </a:lnSpc>
-                        <a:buNone/>
-                      </a:pPr>
-                      <a:r>
-                        <a:rPr lang="en-SG" sz="1400" b="0" dirty="0">
-                          <a:effectLst/>
-                          <a:latin typeface="+mn-lt"/>
-                        </a:rPr>
-                        <a:t>0</a:t>
-                      </a:r>
-                    </a:p>
-                  </a:txBody>
-                  <a:tcPr marL="152400" marT="95250" marB="95250" anchor="ctr"/>
-                </a:tc>
-                <a:extLst>
-                  <a:ext uri="{0D108BD9-81ED-4DB2-BD59-A6C34878D82A}">
-                    <a16:rowId xmlns:a16="http://schemas.microsoft.com/office/drawing/2014/main" val="2026303842"/>
-                  </a:ext>
-                </a:extLst>
-              </a:tr>
             </a:tbl>
           </a:graphicData>
         </a:graphic>
@@ -25344,7 +25183,7 @@
         </p:nvSpPr>
         <p:spPr>
           <a:xfrm>
-            <a:off x="2294311" y="4465236"/>
+            <a:off x="2182089" y="3733792"/>
             <a:ext cx="4779819" cy="523220"/>
           </a:xfrm>
           <a:prstGeom prst="rect">

</xml_diff>